<commit_message>
updating slides in documentation
</commit_message>
<xml_diff>
--- a/documentation/IMS-Presentation.pptx
+++ b/documentation/IMS-Presentation.pptx
@@ -6,6 +6,9 @@
   </p:sldMasterIdLst>
   <p:sldIdLst>
     <p:sldId id="256" r:id="rId2"/>
+    <p:sldId id="257" r:id="rId3"/>
+    <p:sldId id="258" r:id="rId4"/>
+    <p:sldId id="259" r:id="rId5"/>
   </p:sldIdLst>
   <p:sldSz cx="12192000" cy="6858000"/>
   <p:notesSz cx="6858000" cy="9144000"/>
@@ -104,6 +107,11 @@
       </a:defRPr>
     </a:lvl9pPr>
   </p:defaultTextStyle>
+  <p:extLst>
+    <p:ext uri="{EFAFB233-063F-42B5-8137-9DF3F51BA10A}">
+      <p15:sldGuideLst xmlns:p15="http://schemas.microsoft.com/office/powerpoint/2012/main"/>
+    </p:ext>
+  </p:extLst>
 </p:presentation>
 </file>
 
@@ -256,7 +264,7 @@
           <a:p>
             <a:fld id="{C646617D-075A-456A-B368-5B9543915401}" type="datetimeFigureOut">
               <a:rPr lang="en-GB" smtClean="0"/>
-              <a:t>12/09/2020</a:t>
+              <a:t>17/09/2020</a:t>
             </a:fld>
             <a:endParaRPr lang="en-GB"/>
           </a:p>
@@ -456,7 +464,7 @@
           <a:p>
             <a:fld id="{C646617D-075A-456A-B368-5B9543915401}" type="datetimeFigureOut">
               <a:rPr lang="en-GB" smtClean="0"/>
-              <a:t>12/09/2020</a:t>
+              <a:t>17/09/2020</a:t>
             </a:fld>
             <a:endParaRPr lang="en-GB"/>
           </a:p>
@@ -666,7 +674,7 @@
           <a:p>
             <a:fld id="{C646617D-075A-456A-B368-5B9543915401}" type="datetimeFigureOut">
               <a:rPr lang="en-GB" smtClean="0"/>
-              <a:t>12/09/2020</a:t>
+              <a:t>17/09/2020</a:t>
             </a:fld>
             <a:endParaRPr lang="en-GB"/>
           </a:p>
@@ -866,7 +874,7 @@
           <a:p>
             <a:fld id="{C646617D-075A-456A-B368-5B9543915401}" type="datetimeFigureOut">
               <a:rPr lang="en-GB" smtClean="0"/>
-              <a:t>12/09/2020</a:t>
+              <a:t>17/09/2020</a:t>
             </a:fld>
             <a:endParaRPr lang="en-GB"/>
           </a:p>
@@ -1142,7 +1150,7 @@
           <a:p>
             <a:fld id="{C646617D-075A-456A-B368-5B9543915401}" type="datetimeFigureOut">
               <a:rPr lang="en-GB" smtClean="0"/>
-              <a:t>12/09/2020</a:t>
+              <a:t>17/09/2020</a:t>
             </a:fld>
             <a:endParaRPr lang="en-GB"/>
           </a:p>
@@ -1410,7 +1418,7 @@
           <a:p>
             <a:fld id="{C646617D-075A-456A-B368-5B9543915401}" type="datetimeFigureOut">
               <a:rPr lang="en-GB" smtClean="0"/>
-              <a:t>12/09/2020</a:t>
+              <a:t>17/09/2020</a:t>
             </a:fld>
             <a:endParaRPr lang="en-GB"/>
           </a:p>
@@ -1825,7 +1833,7 @@
           <a:p>
             <a:fld id="{C646617D-075A-456A-B368-5B9543915401}" type="datetimeFigureOut">
               <a:rPr lang="en-GB" smtClean="0"/>
-              <a:t>12/09/2020</a:t>
+              <a:t>17/09/2020</a:t>
             </a:fld>
             <a:endParaRPr lang="en-GB"/>
           </a:p>
@@ -1967,7 +1975,7 @@
           <a:p>
             <a:fld id="{C646617D-075A-456A-B368-5B9543915401}" type="datetimeFigureOut">
               <a:rPr lang="en-GB" smtClean="0"/>
-              <a:t>12/09/2020</a:t>
+              <a:t>17/09/2020</a:t>
             </a:fld>
             <a:endParaRPr lang="en-GB"/>
           </a:p>
@@ -2080,7 +2088,7 @@
           <a:p>
             <a:fld id="{C646617D-075A-456A-B368-5B9543915401}" type="datetimeFigureOut">
               <a:rPr lang="en-GB" smtClean="0"/>
-              <a:t>12/09/2020</a:t>
+              <a:t>17/09/2020</a:t>
             </a:fld>
             <a:endParaRPr lang="en-GB"/>
           </a:p>
@@ -2393,7 +2401,7 @@
           <a:p>
             <a:fld id="{C646617D-075A-456A-B368-5B9543915401}" type="datetimeFigureOut">
               <a:rPr lang="en-GB" smtClean="0"/>
-              <a:t>12/09/2020</a:t>
+              <a:t>17/09/2020</a:t>
             </a:fld>
             <a:endParaRPr lang="en-GB"/>
           </a:p>
@@ -2682,7 +2690,7 @@
           <a:p>
             <a:fld id="{C646617D-075A-456A-B368-5B9543915401}" type="datetimeFigureOut">
               <a:rPr lang="en-GB" smtClean="0"/>
-              <a:t>12/09/2020</a:t>
+              <a:t>17/09/2020</a:t>
             </a:fld>
             <a:endParaRPr lang="en-GB"/>
           </a:p>
@@ -2925,7 +2933,7 @@
           <a:p>
             <a:fld id="{C646617D-075A-456A-B368-5B9543915401}" type="datetimeFigureOut">
               <a:rPr lang="en-GB" smtClean="0"/>
-              <a:t>12/09/2020</a:t>
+              <a:t>17/09/2020</a:t>
             </a:fld>
             <a:endParaRPr lang="en-GB"/>
           </a:p>
@@ -3328,6 +3336,14 @@
 <file path=ppt/slides/slide1.xml><?xml version="1.0" encoding="utf-8"?>
 <p:sld xmlns:a="http://schemas.openxmlformats.org/drawingml/2006/main" xmlns:r="http://schemas.openxmlformats.org/officeDocument/2006/relationships" xmlns:p="http://schemas.openxmlformats.org/presentationml/2006/main">
   <p:cSld>
+    <p:bg>
+      <p:bgPr>
+        <a:solidFill>
+          <a:schemeClr val="bg1"/>
+        </a:solidFill>
+        <a:effectLst/>
+      </p:bgPr>
+    </p:bg>
     <p:spTree>
       <p:nvGrpSpPr>
         <p:cNvPr id="1" name=""/>
@@ -3342,6 +3358,192 @@
           <a:chExt cx="0" cy="0"/>
         </a:xfrm>
       </p:grpSpPr>
+      <p:sp useBgFill="1">
+        <p:nvSpPr>
+          <p:cNvPr id="71" name="Rectangle 70">
+            <a:extLst>
+              <a:ext uri="{FF2B5EF4-FFF2-40B4-BE49-F238E27FC236}">
+                <a16:creationId xmlns:a16="http://schemas.microsoft.com/office/drawing/2014/main" id="{0671A8AE-40A1-4631-A6B8-581AFF065482}"/>
+              </a:ext>
+              <a:ext uri="{C183D7F6-B498-43B3-948B-1728B52AA6E4}">
+                <adec:decorative xmlns:adec="http://schemas.microsoft.com/office/drawing/2017/decorative" val="1"/>
+              </a:ext>
+            </a:extLst>
+          </p:cNvPr>
+          <p:cNvSpPr>
+            <a:spLocks noGrp="1" noRot="1" noChangeAspect="1" noMove="1" noResize="1" noEditPoints="1" noAdjustHandles="1" noChangeArrowheads="1" noChangeShapeType="1" noTextEdit="1"/>
+          </p:cNvSpPr>
+          <p:nvPr>
+            <p:extLst>
+              <p:ext uri="{386F3935-93C4-4BCD-93E2-E3B085C9AB24}">
+                <p16:designElem xmlns:p16="http://schemas.microsoft.com/office/powerpoint/2015/main" val="1"/>
+              </p:ext>
+            </p:extLst>
+          </p:nvPr>
+        </p:nvSpPr>
+        <p:spPr>
+          <a:xfrm>
+            <a:off x="0" y="0"/>
+            <a:ext cx="12192000" cy="6858000"/>
+          </a:xfrm>
+          <a:prstGeom prst="rect">
+            <a:avLst/>
+          </a:prstGeom>
+          <a:ln>
+            <a:noFill/>
+          </a:ln>
+        </p:spPr>
+        <p:style>
+          <a:lnRef idx="2">
+            <a:schemeClr val="accent1">
+              <a:shade val="50000"/>
+            </a:schemeClr>
+          </a:lnRef>
+          <a:fillRef idx="1">
+            <a:schemeClr val="accent1"/>
+          </a:fillRef>
+          <a:effectRef idx="0">
+            <a:schemeClr val="accent1"/>
+          </a:effectRef>
+          <a:fontRef idx="minor">
+            <a:schemeClr val="lt1"/>
+          </a:fontRef>
+        </p:style>
+        <p:txBody>
+          <a:bodyPr rtlCol="0" anchor="ctr"/>
+          <a:lstStyle/>
+          <a:p>
+            <a:pPr algn="ctr"/>
+            <a:endParaRPr lang="en-US"/>
+          </a:p>
+        </p:txBody>
+      </p:sp>
+      <p:pic>
+        <p:nvPicPr>
+          <p:cNvPr id="1026" name="Picture 2" descr="SME Inventory Management - Ultimate Guide by Magestore (Infographic)">
+            <a:extLst>
+              <a:ext uri="{FF2B5EF4-FFF2-40B4-BE49-F238E27FC236}">
+                <a16:creationId xmlns:a16="http://schemas.microsoft.com/office/drawing/2014/main" id="{4C58D34B-08BA-4A4C-9D90-EB71753ECE84}"/>
+              </a:ext>
+            </a:extLst>
+          </p:cNvPr>
+          <p:cNvPicPr>
+            <a:picLocks noChangeAspect="1" noChangeArrowheads="1"/>
+          </p:cNvPicPr>
+          <p:nvPr/>
+        </p:nvPicPr>
+        <p:blipFill rotWithShape="1">
+          <a:blip r:embed="rId2">
+            <a:extLst>
+              <a:ext uri="{28A0092B-C50C-407E-A947-70E740481C1C}">
+                <a14:useLocalDpi xmlns:a14="http://schemas.microsoft.com/office/drawing/2010/main" val="0"/>
+              </a:ext>
+            </a:extLst>
+          </a:blip>
+          <a:srcRect l="10789" t="9091" r="24574"/>
+          <a:stretch/>
+        </p:blipFill>
+        <p:spPr bwMode="auto">
+          <a:xfrm>
+            <a:off x="3523488" y="10"/>
+            <a:ext cx="8668512" cy="6857990"/>
+          </a:xfrm>
+          <a:prstGeom prst="rect">
+            <a:avLst/>
+          </a:prstGeom>
+          <a:noFill/>
+          <a:extLst>
+            <a:ext uri="{909E8E84-426E-40DD-AFC4-6F175D3DCCD1}">
+              <a14:hiddenFill xmlns:a14="http://schemas.microsoft.com/office/drawing/2010/main">
+                <a:solidFill>
+                  <a:srgbClr val="FFFFFF"/>
+                </a:solidFill>
+              </a14:hiddenFill>
+            </a:ext>
+          </a:extLst>
+        </p:spPr>
+      </p:pic>
+      <p:sp>
+        <p:nvSpPr>
+          <p:cNvPr id="73" name="Rectangle 72">
+            <a:extLst>
+              <a:ext uri="{FF2B5EF4-FFF2-40B4-BE49-F238E27FC236}">
+                <a16:creationId xmlns:a16="http://schemas.microsoft.com/office/drawing/2014/main" id="{AB58EF07-17C2-48CF-ABB0-EEF1F17CB8F0}"/>
+              </a:ext>
+              <a:ext uri="{C183D7F6-B498-43B3-948B-1728B52AA6E4}">
+                <adec:decorative xmlns:adec="http://schemas.microsoft.com/office/drawing/2017/decorative" val="1"/>
+              </a:ext>
+            </a:extLst>
+          </p:cNvPr>
+          <p:cNvSpPr>
+            <a:spLocks noGrp="1" noRot="1" noChangeAspect="1" noMove="1" noResize="1" noEditPoints="1" noAdjustHandles="1" noChangeArrowheads="1" noChangeShapeType="1" noTextEdit="1"/>
+          </p:cNvSpPr>
+          <p:nvPr>
+            <p:extLst>
+              <p:ext uri="{386F3935-93C4-4BCD-93E2-E3B085C9AB24}">
+                <p16:designElem xmlns:p16="http://schemas.microsoft.com/office/powerpoint/2015/main" val="1"/>
+              </p:ext>
+            </p:extLst>
+          </p:nvPr>
+        </p:nvSpPr>
+        <p:spPr>
+          <a:xfrm>
+            <a:off x="3" y="0"/>
+            <a:ext cx="9339206" cy="6858000"/>
+          </a:xfrm>
+          <a:prstGeom prst="rect">
+            <a:avLst/>
+          </a:prstGeom>
+          <a:gradFill>
+            <a:gsLst>
+              <a:gs pos="58000">
+                <a:schemeClr val="bg1"/>
+              </a:gs>
+              <a:gs pos="33000">
+                <a:schemeClr val="bg1">
+                  <a:alpha val="64000"/>
+                </a:schemeClr>
+              </a:gs>
+              <a:gs pos="0">
+                <a:schemeClr val="bg1">
+                  <a:alpha val="0"/>
+                </a:schemeClr>
+              </a:gs>
+              <a:gs pos="100000">
+                <a:schemeClr val="bg1"/>
+              </a:gs>
+            </a:gsLst>
+            <a:lin ang="10800000" scaled="0"/>
+          </a:gradFill>
+          <a:ln>
+            <a:noFill/>
+          </a:ln>
+        </p:spPr>
+        <p:style>
+          <a:lnRef idx="2">
+            <a:schemeClr val="accent1">
+              <a:shade val="50000"/>
+            </a:schemeClr>
+          </a:lnRef>
+          <a:fillRef idx="1">
+            <a:schemeClr val="accent1"/>
+          </a:fillRef>
+          <a:effectRef idx="0">
+            <a:schemeClr val="accent1"/>
+          </a:effectRef>
+          <a:fontRef idx="minor">
+            <a:schemeClr val="lt1"/>
+          </a:fontRef>
+        </p:style>
+        <p:txBody>
+          <a:bodyPr rtlCol="0" anchor="ctr"/>
+          <a:lstStyle/>
+          <a:p>
+            <a:pPr algn="ctr"/>
+            <a:endParaRPr lang="en-US" dirty="0"/>
+          </a:p>
+        </p:txBody>
+      </p:sp>
       <p:sp>
         <p:nvSpPr>
           <p:cNvPr id="2" name="Title 1">
@@ -3358,12 +3560,23 @@
             <p:ph type="ctrTitle"/>
           </p:nvPr>
         </p:nvSpPr>
-        <p:spPr/>
-        <p:txBody>
-          <a:bodyPr/>
-          <a:lstStyle/>
-          <a:p>
-            <a:endParaRPr lang="en-GB"/>
+        <p:spPr>
+          <a:xfrm>
+            <a:off x="477981" y="1122363"/>
+            <a:ext cx="4023360" cy="3204134"/>
+          </a:xfrm>
+        </p:spPr>
+        <p:txBody>
+          <a:bodyPr anchor="b">
+            <a:normAutofit/>
+          </a:bodyPr>
+          <a:lstStyle/>
+          <a:p>
+            <a:pPr algn="l"/>
+            <a:r>
+              <a:rPr lang="en-GB" sz="4800" dirty="0"/>
+              <a:t>Inventory Management System - QA </a:t>
+            </a:r>
           </a:p>
         </p:txBody>
       </p:sp>
@@ -3383,12 +3596,184 @@
             <p:ph type="subTitle" idx="1"/>
           </p:nvPr>
         </p:nvSpPr>
-        <p:spPr/>
-        <p:txBody>
-          <a:bodyPr/>
-          <a:lstStyle/>
-          <a:p>
-            <a:endParaRPr lang="en-GB"/>
+        <p:spPr>
+          <a:xfrm>
+            <a:off x="477980" y="4872922"/>
+            <a:ext cx="4023359" cy="1208141"/>
+          </a:xfrm>
+        </p:spPr>
+        <p:txBody>
+          <a:bodyPr>
+            <a:normAutofit/>
+          </a:bodyPr>
+          <a:lstStyle/>
+          <a:p>
+            <a:pPr algn="l"/>
+            <a:r>
+              <a:rPr lang="en-GB" sz="2000" dirty="0"/>
+              <a:t>Sangiv Giovanni Karunakaran</a:t>
+            </a:r>
+          </a:p>
+        </p:txBody>
+      </p:sp>
+      <p:sp>
+        <p:nvSpPr>
+          <p:cNvPr id="75" name="Rectangle 74">
+            <a:extLst>
+              <a:ext uri="{FF2B5EF4-FFF2-40B4-BE49-F238E27FC236}">
+                <a16:creationId xmlns:a16="http://schemas.microsoft.com/office/drawing/2014/main" id="{AF2F604E-43BE-4DC3-B983-E071523364F8}"/>
+              </a:ext>
+              <a:ext uri="{C183D7F6-B498-43B3-948B-1728B52AA6E4}">
+                <adec:decorative xmlns:adec="http://schemas.microsoft.com/office/drawing/2017/decorative" val="1"/>
+              </a:ext>
+            </a:extLst>
+          </p:cNvPr>
+          <p:cNvSpPr>
+            <a:spLocks noGrp="1" noRot="1" noChangeAspect="1" noMove="1" noResize="1" noEditPoints="1" noAdjustHandles="1" noChangeArrowheads="1" noChangeShapeType="1" noTextEdit="1"/>
+          </p:cNvSpPr>
+          <p:nvPr>
+            <p:extLst>
+              <p:ext uri="{386F3935-93C4-4BCD-93E2-E3B085C9AB24}">
+                <p16:designElem xmlns:p16="http://schemas.microsoft.com/office/powerpoint/2015/main" val="1"/>
+              </p:ext>
+            </p:extLst>
+          </p:nvPr>
+        </p:nvSpPr>
+        <p:spPr>
+          <a:xfrm rot="5400000">
+            <a:off x="759921" y="346791"/>
+            <a:ext cx="146304" cy="704088"/>
+          </a:xfrm>
+          <a:prstGeom prst="rect">
+            <a:avLst/>
+          </a:prstGeom>
+          <a:solidFill>
+            <a:schemeClr val="accent2"/>
+          </a:solidFill>
+          <a:ln>
+            <a:noFill/>
+          </a:ln>
+        </p:spPr>
+        <p:style>
+          <a:lnRef idx="2">
+            <a:schemeClr val="accent1">
+              <a:shade val="50000"/>
+            </a:schemeClr>
+          </a:lnRef>
+          <a:fillRef idx="1">
+            <a:schemeClr val="accent1"/>
+          </a:fillRef>
+          <a:effectRef idx="0">
+            <a:schemeClr val="accent1"/>
+          </a:effectRef>
+          <a:fontRef idx="minor">
+            <a:schemeClr val="lt1"/>
+          </a:fontRef>
+        </p:style>
+        <p:txBody>
+          <a:bodyPr rtlCol="0" anchor="ctr"/>
+          <a:lstStyle/>
+          <a:p>
+            <a:pPr algn="ctr"/>
+            <a:endParaRPr lang="en-US">
+              <a:solidFill>
+                <a:prstClr val="white"/>
+              </a:solidFill>
+              <a:latin typeface="Calibri" panose="020F0502020204030204"/>
+            </a:endParaRPr>
+          </a:p>
+        </p:txBody>
+      </p:sp>
+      <p:sp>
+        <p:nvSpPr>
+          <p:cNvPr id="77" name="Rectangle 76">
+            <a:extLst>
+              <a:ext uri="{FF2B5EF4-FFF2-40B4-BE49-F238E27FC236}">
+                <a16:creationId xmlns:a16="http://schemas.microsoft.com/office/drawing/2014/main" id="{08C9B587-E65E-4B52-B37C-ABEBB6E87928}"/>
+              </a:ext>
+              <a:ext uri="{C183D7F6-B498-43B3-948B-1728B52AA6E4}">
+                <adec:decorative xmlns:adec="http://schemas.microsoft.com/office/drawing/2017/decorative" val="1"/>
+              </a:ext>
+            </a:extLst>
+          </p:cNvPr>
+          <p:cNvSpPr>
+            <a:spLocks noGrp="1" noRot="1" noChangeAspect="1" noMove="1" noResize="1" noEditPoints="1" noAdjustHandles="1" noChangeArrowheads="1" noChangeShapeType="1" noTextEdit="1"/>
+          </p:cNvSpPr>
+          <p:nvPr>
+            <p:extLst>
+              <p:ext uri="{386F3935-93C4-4BCD-93E2-E3B085C9AB24}">
+                <p16:designElem xmlns:p16="http://schemas.microsoft.com/office/powerpoint/2015/main" val="1"/>
+              </p:ext>
+            </p:extLst>
+          </p:nvPr>
+        </p:nvSpPr>
+        <p:spPr>
+          <a:xfrm>
+            <a:off x="481029" y="4546920"/>
+            <a:ext cx="3977640" cy="18288"/>
+          </a:xfrm>
+          <a:prstGeom prst="rect">
+            <a:avLst/>
+          </a:prstGeom>
+          <a:solidFill>
+            <a:schemeClr val="tx1"/>
+          </a:solidFill>
+          <a:ln w="3175">
+            <a:noFill/>
+          </a:ln>
+          <a:effectLst/>
+        </p:spPr>
+        <p:style>
+          <a:lnRef idx="2">
+            <a:schemeClr val="accent1">
+              <a:shade val="50000"/>
+            </a:schemeClr>
+          </a:lnRef>
+          <a:fillRef idx="1">
+            <a:schemeClr val="accent1"/>
+          </a:fillRef>
+          <a:effectRef idx="0">
+            <a:schemeClr val="accent1"/>
+          </a:effectRef>
+          <a:fontRef idx="minor">
+            <a:schemeClr val="lt1"/>
+          </a:fontRef>
+        </p:style>
+        <p:txBody>
+          <a:bodyPr rtlCol="0" anchor="ctr"/>
+          <a:lstStyle/>
+          <a:p>
+            <a:pPr marL="0" marR="0" lvl="0" indent="0" algn="ctr" defTabSz="914400" rtl="0" eaLnBrk="1" fontAlgn="auto" latinLnBrk="0" hangingPunct="1">
+              <a:lnSpc>
+                <a:spcPct val="100000"/>
+              </a:lnSpc>
+              <a:spcBef>
+                <a:spcPts val="0"/>
+              </a:spcBef>
+              <a:spcAft>
+                <a:spcPts val="0"/>
+              </a:spcAft>
+              <a:buClrTx/>
+              <a:buSzTx/>
+              <a:buFontTx/>
+              <a:buNone/>
+              <a:tabLst/>
+              <a:defRPr/>
+            </a:pPr>
+            <a:endParaRPr kumimoji="0" lang="en-US" sz="1800" b="0" i="0" u="none" strike="noStrike" kern="1200" cap="none" spc="0" normalizeH="0" baseline="0" noProof="0">
+              <a:ln>
+                <a:noFill/>
+              </a:ln>
+              <a:solidFill>
+                <a:prstClr val="white"/>
+              </a:solidFill>
+              <a:effectLst/>
+              <a:uLnTx/>
+              <a:uFillTx/>
+              <a:latin typeface="Calibri" panose="020F0502020204030204"/>
+              <a:ea typeface="+mn-ea"/>
+              <a:cs typeface="+mn-cs"/>
+            </a:endParaRPr>
           </a:p>
         </p:txBody>
       </p:sp>
@@ -3396,6 +3781,2008 @@
     <p:extLst>
       <p:ext uri="{BB962C8B-B14F-4D97-AF65-F5344CB8AC3E}">
         <p14:creationId xmlns:p14="http://schemas.microsoft.com/office/powerpoint/2010/main" val="3581255464"/>
+      </p:ext>
+    </p:extLst>
+  </p:cSld>
+  <p:clrMapOvr>
+    <a:overrideClrMapping bg1="dk1" tx1="lt1" bg2="dk2" tx2="lt2" accent1="accent1" accent2="accent2" accent3="accent3" accent4="accent4" accent5="accent5" accent6="accent6" hlink="hlink" folHlink="folHlink"/>
+  </p:clrMapOvr>
+</p:sld>
+</file>
+
+<file path=ppt/slides/slide2.xml><?xml version="1.0" encoding="utf-8"?>
+<p:sld xmlns:a="http://schemas.openxmlformats.org/drawingml/2006/main" xmlns:r="http://schemas.openxmlformats.org/officeDocument/2006/relationships" xmlns:p="http://schemas.openxmlformats.org/presentationml/2006/main">
+  <p:cSld>
+    <p:bg>
+      <p:bgPr>
+        <a:solidFill>
+          <a:schemeClr val="bg1"/>
+        </a:solidFill>
+        <a:effectLst/>
+      </p:bgPr>
+    </p:bg>
+    <p:spTree>
+      <p:nvGrpSpPr>
+        <p:cNvPr id="1" name=""/>
+        <p:cNvGrpSpPr/>
+        <p:nvPr/>
+      </p:nvGrpSpPr>
+      <p:grpSpPr>
+        <a:xfrm>
+          <a:off x="0" y="0"/>
+          <a:ext cx="0" cy="0"/>
+          <a:chOff x="0" y="0"/>
+          <a:chExt cx="0" cy="0"/>
+        </a:xfrm>
+      </p:grpSpPr>
+      <p:sp>
+        <p:nvSpPr>
+          <p:cNvPr id="10" name="Rectangle 9">
+            <a:extLst>
+              <a:ext uri="{FF2B5EF4-FFF2-40B4-BE49-F238E27FC236}">
+                <a16:creationId xmlns:a16="http://schemas.microsoft.com/office/drawing/2014/main" id="{823AC064-BC96-4F32-8AE1-B2FD38754823}"/>
+              </a:ext>
+              <a:ext uri="{C183D7F6-B498-43B3-948B-1728B52AA6E4}">
+                <adec:decorative xmlns:adec="http://schemas.microsoft.com/office/drawing/2017/decorative" val="1"/>
+              </a:ext>
+            </a:extLst>
+          </p:cNvPr>
+          <p:cNvSpPr>
+            <a:spLocks noGrp="1" noRot="1" noChangeAspect="1" noMove="1" noResize="1" noEditPoints="1" noAdjustHandles="1" noChangeArrowheads="1" noChangeShapeType="1" noTextEdit="1"/>
+          </p:cNvSpPr>
+          <p:nvPr>
+            <p:extLst>
+              <p:ext uri="{386F3935-93C4-4BCD-93E2-E3B085C9AB24}">
+                <p16:designElem xmlns:p16="http://schemas.microsoft.com/office/powerpoint/2015/main" val="1"/>
+              </p:ext>
+            </p:extLst>
+          </p:nvPr>
+        </p:nvSpPr>
+        <p:spPr bwMode="ltGray">
+          <a:xfrm>
+            <a:off x="396882" y="280374"/>
+            <a:ext cx="11438793" cy="1844256"/>
+          </a:xfrm>
+          <a:prstGeom prst="rect">
+            <a:avLst/>
+          </a:prstGeom>
+          <a:solidFill>
+            <a:srgbClr val="404040"/>
+          </a:solidFill>
+          <a:ln w="127000" cap="sq" cmpd="thinThick">
+            <a:solidFill>
+              <a:srgbClr val="404040"/>
+            </a:solidFill>
+          </a:ln>
+        </p:spPr>
+        <p:style>
+          <a:lnRef idx="2">
+            <a:schemeClr val="accent1">
+              <a:shade val="50000"/>
+            </a:schemeClr>
+          </a:lnRef>
+          <a:fillRef idx="1">
+            <a:schemeClr val="accent1"/>
+          </a:fillRef>
+          <a:effectRef idx="0">
+            <a:schemeClr val="accent1"/>
+          </a:effectRef>
+          <a:fontRef idx="minor">
+            <a:schemeClr val="lt1"/>
+          </a:fontRef>
+        </p:style>
+        <p:txBody>
+          <a:bodyPr rtlCol="0" anchor="ctr"/>
+          <a:lstStyle/>
+          <a:p>
+            <a:pPr algn="ctr"/>
+            <a:endParaRPr lang="en-US"/>
+          </a:p>
+        </p:txBody>
+      </p:sp>
+      <p:sp>
+        <p:nvSpPr>
+          <p:cNvPr id="2" name="Title 1">
+            <a:extLst>
+              <a:ext uri="{FF2B5EF4-FFF2-40B4-BE49-F238E27FC236}">
+                <a16:creationId xmlns:a16="http://schemas.microsoft.com/office/drawing/2014/main" id="{887B934B-8770-4DA9-815C-A24D63B63231}"/>
+              </a:ext>
+            </a:extLst>
+          </p:cNvPr>
+          <p:cNvSpPr>
+            <a:spLocks noGrp="1"/>
+          </p:cNvSpPr>
+          <p:nvPr>
+            <p:ph type="title"/>
+          </p:nvPr>
+        </p:nvSpPr>
+        <p:spPr>
+          <a:xfrm>
+            <a:off x="546351" y="433545"/>
+            <a:ext cx="11139854" cy="930447"/>
+          </a:xfrm>
+        </p:spPr>
+        <p:txBody>
+          <a:bodyPr vert="horz" lIns="91440" tIns="45720" rIns="91440" bIns="45720" rtlCol="0" anchor="b">
+            <a:normAutofit/>
+          </a:bodyPr>
+          <a:lstStyle/>
+          <a:p>
+            <a:pPr algn="ctr"/>
+            <a:r>
+              <a:rPr lang="en-US" sz="5400" dirty="0">
+                <a:solidFill>
+                  <a:srgbClr val="FFFFFF"/>
+                </a:solidFill>
+              </a:rPr>
+              <a:t>Approach</a:t>
+            </a:r>
+          </a:p>
+        </p:txBody>
+      </p:sp>
+      <p:cxnSp>
+        <p:nvCxnSpPr>
+          <p:cNvPr id="12" name="Straight Connector 11">
+            <a:extLst>
+              <a:ext uri="{FF2B5EF4-FFF2-40B4-BE49-F238E27FC236}">
+                <a16:creationId xmlns:a16="http://schemas.microsoft.com/office/drawing/2014/main" id="{7E7C77BC-7138-40B1-A15B-20F57A494629}"/>
+              </a:ext>
+              <a:ext uri="{C183D7F6-B498-43B3-948B-1728B52AA6E4}">
+                <adec:decorative xmlns:adec="http://schemas.microsoft.com/office/drawing/2017/decorative" val="1"/>
+              </a:ext>
+            </a:extLst>
+          </p:cNvPr>
+          <p:cNvCxnSpPr>
+            <a:cxnSpLocks noGrp="1" noRot="1" noChangeAspect="1" noMove="1" noResize="1" noEditPoints="1" noAdjustHandles="1" noChangeArrowheads="1" noChangeShapeType="1"/>
+          </p:cNvCxnSpPr>
+          <p:nvPr>
+            <p:extLst>
+              <p:ext uri="{386F3935-93C4-4BCD-93E2-E3B085C9AB24}">
+                <p16:designElem xmlns:p16="http://schemas.microsoft.com/office/powerpoint/2015/main" val="1"/>
+              </p:ext>
+            </p:extLst>
+          </p:nvPr>
+        </p:nvCxnSpPr>
+        <p:spPr>
+          <a:xfrm>
+            <a:off x="2230078" y="1522292"/>
+            <a:ext cx="7772400" cy="0"/>
+          </a:xfrm>
+          <a:prstGeom prst="line">
+            <a:avLst/>
+          </a:prstGeom>
+          <a:ln w="22225">
+            <a:solidFill>
+              <a:srgbClr val="D9D9D9"/>
+            </a:solidFill>
+          </a:ln>
+        </p:spPr>
+        <p:style>
+          <a:lnRef idx="1">
+            <a:schemeClr val="accent1"/>
+          </a:lnRef>
+          <a:fillRef idx="0">
+            <a:schemeClr val="accent1"/>
+          </a:fillRef>
+          <a:effectRef idx="0">
+            <a:schemeClr val="accent1"/>
+          </a:effectRef>
+          <a:fontRef idx="minor">
+            <a:schemeClr val="tx1"/>
+          </a:fontRef>
+        </p:style>
+      </p:cxnSp>
+      <p:pic>
+        <p:nvPicPr>
+          <p:cNvPr id="5" name="Picture 4" descr="A screenshot of text&#10;&#10;Description automatically generated">
+            <a:extLst>
+              <a:ext uri="{FF2B5EF4-FFF2-40B4-BE49-F238E27FC236}">
+                <a16:creationId xmlns:a16="http://schemas.microsoft.com/office/drawing/2014/main" id="{77963B8A-CA92-4025-9A2B-82FBE342FD19}"/>
+              </a:ext>
+            </a:extLst>
+          </p:cNvPr>
+          <p:cNvPicPr>
+            <a:picLocks noChangeAspect="1"/>
+          </p:cNvPicPr>
+          <p:nvPr/>
+        </p:nvPicPr>
+        <p:blipFill>
+          <a:blip r:embed="rId2"/>
+          <a:stretch>
+            <a:fillRect/>
+          </a:stretch>
+        </p:blipFill>
+        <p:spPr>
+          <a:xfrm>
+            <a:off x="618823" y="2277801"/>
+            <a:ext cx="5089511" cy="4338808"/>
+          </a:xfrm>
+          <a:prstGeom prst="rect">
+            <a:avLst/>
+          </a:prstGeom>
+        </p:spPr>
+      </p:pic>
+      <p:cxnSp>
+        <p:nvCxnSpPr>
+          <p:cNvPr id="14" name="Straight Connector 13">
+            <a:extLst>
+              <a:ext uri="{FF2B5EF4-FFF2-40B4-BE49-F238E27FC236}">
+                <a16:creationId xmlns:a16="http://schemas.microsoft.com/office/drawing/2014/main" id="{DB146403-F3D6-484B-B2ED-97F9565D0370}"/>
+              </a:ext>
+              <a:ext uri="{C183D7F6-B498-43B3-948B-1728B52AA6E4}">
+                <adec:decorative xmlns:adec="http://schemas.microsoft.com/office/drawing/2017/decorative" val="1"/>
+              </a:ext>
+            </a:extLst>
+          </p:cNvPr>
+          <p:cNvCxnSpPr>
+            <a:cxnSpLocks noGrp="1" noRot="1" noChangeAspect="1" noMove="1" noResize="1" noEditPoints="1" noAdjustHandles="1" noChangeArrowheads="1" noChangeShapeType="1"/>
+          </p:cNvCxnSpPr>
+          <p:nvPr>
+            <p:extLst>
+              <p:ext uri="{386F3935-93C4-4BCD-93E2-E3B085C9AB24}">
+                <p16:designElem xmlns:p16="http://schemas.microsoft.com/office/powerpoint/2015/main" val="1"/>
+              </p:ext>
+            </p:extLst>
+          </p:nvPr>
+        </p:nvCxnSpPr>
+        <p:spPr>
+          <a:xfrm>
+            <a:off x="6116278" y="2596836"/>
+            <a:ext cx="0" cy="3657600"/>
+          </a:xfrm>
+          <a:prstGeom prst="line">
+            <a:avLst/>
+          </a:prstGeom>
+          <a:ln w="101600" cmpd="dbl">
+            <a:solidFill>
+              <a:srgbClr val="595959"/>
+            </a:solidFill>
+          </a:ln>
+        </p:spPr>
+        <p:style>
+          <a:lnRef idx="1">
+            <a:schemeClr val="accent1"/>
+          </a:lnRef>
+          <a:fillRef idx="0">
+            <a:schemeClr val="accent1"/>
+          </a:fillRef>
+          <a:effectRef idx="0">
+            <a:schemeClr val="accent1"/>
+          </a:effectRef>
+          <a:fontRef idx="minor">
+            <a:schemeClr val="tx1"/>
+          </a:fontRef>
+        </p:style>
+      </p:cxnSp>
+      <p:pic>
+        <p:nvPicPr>
+          <p:cNvPr id="4" name="Picture 3" descr="A screenshot of a cell phone&#10;&#10;Description automatically generated">
+            <a:extLst>
+              <a:ext uri="{FF2B5EF4-FFF2-40B4-BE49-F238E27FC236}">
+                <a16:creationId xmlns:a16="http://schemas.microsoft.com/office/drawing/2014/main" id="{F6DB4D98-1C46-4A86-BAB4-289D6CE4E2F7}"/>
+              </a:ext>
+            </a:extLst>
+          </p:cNvPr>
+          <p:cNvPicPr>
+            <a:picLocks noChangeAspect="1"/>
+          </p:cNvPicPr>
+          <p:nvPr/>
+        </p:nvPicPr>
+        <p:blipFill>
+          <a:blip r:embed="rId3"/>
+          <a:stretch>
+            <a:fillRect/>
+          </a:stretch>
+        </p:blipFill>
+        <p:spPr>
+          <a:xfrm>
+            <a:off x="6316917" y="4016378"/>
+            <a:ext cx="5743968" cy="818515"/>
+          </a:xfrm>
+          <a:prstGeom prst="rect">
+            <a:avLst/>
+          </a:prstGeom>
+        </p:spPr>
+      </p:pic>
+    </p:spTree>
+    <p:extLst>
+      <p:ext uri="{BB962C8B-B14F-4D97-AF65-F5344CB8AC3E}">
+        <p14:creationId xmlns:p14="http://schemas.microsoft.com/office/powerpoint/2010/main" val="3022070046"/>
+      </p:ext>
+    </p:extLst>
+  </p:cSld>
+  <p:clrMapOvr>
+    <a:masterClrMapping/>
+  </p:clrMapOvr>
+</p:sld>
+</file>
+
+<file path=ppt/slides/slide3.xml><?xml version="1.0" encoding="utf-8"?>
+<p:sld xmlns:a="http://schemas.openxmlformats.org/drawingml/2006/main" xmlns:r="http://schemas.openxmlformats.org/officeDocument/2006/relationships" xmlns:p="http://schemas.openxmlformats.org/presentationml/2006/main">
+  <p:cSld>
+    <p:bg>
+      <p:bgPr>
+        <a:solidFill>
+          <a:schemeClr val="bg1"/>
+        </a:solidFill>
+        <a:effectLst/>
+      </p:bgPr>
+    </p:bg>
+    <p:spTree>
+      <p:nvGrpSpPr>
+        <p:cNvPr id="1" name=""/>
+        <p:cNvGrpSpPr/>
+        <p:nvPr/>
+      </p:nvGrpSpPr>
+      <p:grpSpPr>
+        <a:xfrm>
+          <a:off x="0" y="0"/>
+          <a:ext cx="0" cy="0"/>
+          <a:chOff x="0" y="0"/>
+          <a:chExt cx="0" cy="0"/>
+        </a:xfrm>
+      </p:grpSpPr>
+      <p:sp useBgFill="1">
+        <p:nvSpPr>
+          <p:cNvPr id="8" name="Rectangle 7">
+            <a:extLst>
+              <a:ext uri="{FF2B5EF4-FFF2-40B4-BE49-F238E27FC236}">
+                <a16:creationId xmlns:a16="http://schemas.microsoft.com/office/drawing/2014/main" id="{081EA652-8C6A-4E69-BEB9-170809474553}"/>
+              </a:ext>
+              <a:ext uri="{C183D7F6-B498-43B3-948B-1728B52AA6E4}">
+                <adec:decorative xmlns:adec="http://schemas.microsoft.com/office/drawing/2017/decorative" val="1"/>
+              </a:ext>
+            </a:extLst>
+          </p:cNvPr>
+          <p:cNvSpPr>
+            <a:spLocks noGrp="1" noRot="1" noChangeAspect="1" noMove="1" noResize="1" noEditPoints="1" noAdjustHandles="1" noChangeArrowheads="1" noChangeShapeType="1" noTextEdit="1"/>
+          </p:cNvSpPr>
+          <p:nvPr>
+            <p:extLst>
+              <p:ext uri="{386F3935-93C4-4BCD-93E2-E3B085C9AB24}">
+                <p16:designElem xmlns:p16="http://schemas.microsoft.com/office/powerpoint/2015/main" val="1"/>
+              </p:ext>
+            </p:extLst>
+          </p:nvPr>
+        </p:nvSpPr>
+        <p:spPr>
+          <a:xfrm>
+            <a:off x="0" y="0"/>
+            <a:ext cx="12192000" cy="6858000"/>
+          </a:xfrm>
+          <a:prstGeom prst="rect">
+            <a:avLst/>
+          </a:prstGeom>
+          <a:ln>
+            <a:noFill/>
+          </a:ln>
+        </p:spPr>
+        <p:style>
+          <a:lnRef idx="2">
+            <a:schemeClr val="accent1">
+              <a:shade val="50000"/>
+            </a:schemeClr>
+          </a:lnRef>
+          <a:fillRef idx="1">
+            <a:schemeClr val="accent1"/>
+          </a:fillRef>
+          <a:effectRef idx="0">
+            <a:schemeClr val="accent1"/>
+          </a:effectRef>
+          <a:fontRef idx="minor">
+            <a:schemeClr val="lt1"/>
+          </a:fontRef>
+        </p:style>
+        <p:txBody>
+          <a:bodyPr rtlCol="0" anchor="ctr"/>
+          <a:lstStyle/>
+          <a:p>
+            <a:pPr algn="ctr"/>
+            <a:endParaRPr lang="en-US"/>
+          </a:p>
+        </p:txBody>
+      </p:sp>
+      <p:sp>
+        <p:nvSpPr>
+          <p:cNvPr id="10" name="Right Triangle 9">
+            <a:extLst>
+              <a:ext uri="{FF2B5EF4-FFF2-40B4-BE49-F238E27FC236}">
+                <a16:creationId xmlns:a16="http://schemas.microsoft.com/office/drawing/2014/main" id="{5298780A-33B9-4EA2-8F67-DE68AD62841B}"/>
+              </a:ext>
+              <a:ext uri="{C183D7F6-B498-43B3-948B-1728B52AA6E4}">
+                <adec:decorative xmlns:adec="http://schemas.microsoft.com/office/drawing/2017/decorative" val="1"/>
+              </a:ext>
+            </a:extLst>
+          </p:cNvPr>
+          <p:cNvSpPr>
+            <a:spLocks noGrp="1" noRot="1" noChangeAspect="1" noMove="1" noResize="1" noEditPoints="1" noAdjustHandles="1" noChangeArrowheads="1" noChangeShapeType="1" noTextEdit="1"/>
+          </p:cNvSpPr>
+          <p:nvPr>
+            <p:extLst>
+              <p:ext uri="{386F3935-93C4-4BCD-93E2-E3B085C9AB24}">
+                <p16:designElem xmlns:p16="http://schemas.microsoft.com/office/powerpoint/2015/main" val="1"/>
+              </p:ext>
+            </p:extLst>
+          </p:nvPr>
+        </p:nvSpPr>
+        <p:spPr>
+          <a:xfrm flipH="1">
+            <a:off x="8576720" y="3335867"/>
+            <a:ext cx="3291840" cy="3200400"/>
+          </a:xfrm>
+          <a:prstGeom prst="rtTriangle">
+            <a:avLst/>
+          </a:prstGeom>
+          <a:solidFill>
+            <a:schemeClr val="accent4"/>
+          </a:solidFill>
+          <a:ln>
+            <a:noFill/>
+          </a:ln>
+        </p:spPr>
+        <p:style>
+          <a:lnRef idx="2">
+            <a:schemeClr val="accent1">
+              <a:shade val="50000"/>
+            </a:schemeClr>
+          </a:lnRef>
+          <a:fillRef idx="1">
+            <a:schemeClr val="accent1"/>
+          </a:fillRef>
+          <a:effectRef idx="0">
+            <a:schemeClr val="accent1"/>
+          </a:effectRef>
+          <a:fontRef idx="minor">
+            <a:schemeClr val="lt1"/>
+          </a:fontRef>
+        </p:style>
+        <p:txBody>
+          <a:bodyPr rtlCol="0" anchor="ctr"/>
+          <a:lstStyle/>
+          <a:p>
+            <a:pPr algn="ctr"/>
+            <a:endParaRPr lang="en-US" dirty="0"/>
+          </a:p>
+        </p:txBody>
+      </p:sp>
+      <p:sp>
+        <p:nvSpPr>
+          <p:cNvPr id="12" name="Rectangle 11">
+            <a:extLst>
+              <a:ext uri="{FF2B5EF4-FFF2-40B4-BE49-F238E27FC236}">
+                <a16:creationId xmlns:a16="http://schemas.microsoft.com/office/drawing/2014/main" id="{7F488E8B-4E1E-4402-8935-D4E6C02615C7}"/>
+              </a:ext>
+              <a:ext uri="{C183D7F6-B498-43B3-948B-1728B52AA6E4}">
+                <adec:decorative xmlns:adec="http://schemas.microsoft.com/office/drawing/2017/decorative" val="1"/>
+              </a:ext>
+            </a:extLst>
+          </p:cNvPr>
+          <p:cNvSpPr>
+            <a:spLocks noGrp="1" noRot="1" noChangeAspect="1" noMove="1" noResize="1" noEditPoints="1" noAdjustHandles="1" noChangeArrowheads="1" noChangeShapeType="1" noTextEdit="1"/>
+          </p:cNvSpPr>
+          <p:nvPr>
+            <p:extLst>
+              <p:ext uri="{386F3935-93C4-4BCD-93E2-E3B085C9AB24}">
+                <p16:designElem xmlns:p16="http://schemas.microsoft.com/office/powerpoint/2015/main" val="1"/>
+              </p:ext>
+            </p:extLst>
+          </p:nvPr>
+        </p:nvSpPr>
+        <p:spPr>
+          <a:xfrm>
+            <a:off x="641774" y="623275"/>
+            <a:ext cx="10905053" cy="5607882"/>
+          </a:xfrm>
+          <a:prstGeom prst="rect">
+            <a:avLst/>
+          </a:prstGeom>
+          <a:noFill/>
+          <a:ln w="19050">
+            <a:solidFill>
+              <a:schemeClr val="tx1">
+                <a:lumMod val="75000"/>
+                <a:lumOff val="25000"/>
+              </a:schemeClr>
+            </a:solidFill>
+          </a:ln>
+        </p:spPr>
+        <p:style>
+          <a:lnRef idx="2">
+            <a:schemeClr val="accent1">
+              <a:shade val="50000"/>
+            </a:schemeClr>
+          </a:lnRef>
+          <a:fillRef idx="1">
+            <a:schemeClr val="accent1"/>
+          </a:fillRef>
+          <a:effectRef idx="0">
+            <a:schemeClr val="accent1"/>
+          </a:effectRef>
+          <a:fontRef idx="minor">
+            <a:schemeClr val="lt1"/>
+          </a:fontRef>
+        </p:style>
+        <p:txBody>
+          <a:bodyPr rtlCol="0" anchor="ctr"/>
+          <a:lstStyle/>
+          <a:p>
+            <a:pPr algn="ctr"/>
+            <a:endParaRPr lang="en-US"/>
+          </a:p>
+        </p:txBody>
+      </p:sp>
+      <p:sp>
+        <p:nvSpPr>
+          <p:cNvPr id="2" name="Title 1">
+            <a:extLst>
+              <a:ext uri="{FF2B5EF4-FFF2-40B4-BE49-F238E27FC236}">
+                <a16:creationId xmlns:a16="http://schemas.microsoft.com/office/drawing/2014/main" id="{E7D30F2C-32C0-4BD2-B9C9-B1C21EC2836E}"/>
+              </a:ext>
+            </a:extLst>
+          </p:cNvPr>
+          <p:cNvSpPr>
+            <a:spLocks noGrp="1"/>
+          </p:cNvSpPr>
+          <p:nvPr>
+            <p:ph type="title"/>
+          </p:nvPr>
+        </p:nvSpPr>
+        <p:spPr>
+          <a:xfrm>
+            <a:off x="1075767" y="1188637"/>
+            <a:ext cx="2988234" cy="4480726"/>
+          </a:xfrm>
+        </p:spPr>
+        <p:txBody>
+          <a:bodyPr>
+            <a:normAutofit/>
+          </a:bodyPr>
+          <a:lstStyle/>
+          <a:p>
+            <a:pPr algn="r"/>
+            <a:r>
+              <a:rPr lang="en-GB" sz="5100"/>
+              <a:t>Consultant Journey</a:t>
+            </a:r>
+          </a:p>
+        </p:txBody>
+      </p:sp>
+      <p:cxnSp>
+        <p:nvCxnSpPr>
+          <p:cNvPr id="14" name="Straight Connector 13">
+            <a:extLst>
+              <a:ext uri="{FF2B5EF4-FFF2-40B4-BE49-F238E27FC236}">
+                <a16:creationId xmlns:a16="http://schemas.microsoft.com/office/drawing/2014/main" id="{23AAC9B5-8015-485C-ACF9-A750390E9A56}"/>
+              </a:ext>
+              <a:ext uri="{C183D7F6-B498-43B3-948B-1728B52AA6E4}">
+                <adec:decorative xmlns:adec="http://schemas.microsoft.com/office/drawing/2017/decorative" val="1"/>
+              </a:ext>
+            </a:extLst>
+          </p:cNvPr>
+          <p:cNvCxnSpPr>
+            <a:cxnSpLocks noGrp="1" noRot="1" noChangeAspect="1" noMove="1" noResize="1" noEditPoints="1" noAdjustHandles="1" noChangeArrowheads="1" noChangeShapeType="1"/>
+          </p:cNvCxnSpPr>
+          <p:nvPr>
+            <p:extLst>
+              <p:ext uri="{386F3935-93C4-4BCD-93E2-E3B085C9AB24}">
+                <p16:designElem xmlns:p16="http://schemas.microsoft.com/office/powerpoint/2015/main" val="1"/>
+              </p:ext>
+            </p:extLst>
+          </p:nvPr>
+        </p:nvCxnSpPr>
+        <p:spPr>
+          <a:xfrm>
+            <a:off x="4654296" y="1852863"/>
+            <a:ext cx="0" cy="3236495"/>
+          </a:xfrm>
+          <a:prstGeom prst="line">
+            <a:avLst/>
+          </a:prstGeom>
+          <a:ln w="19050" cap="sq">
+            <a:solidFill>
+              <a:schemeClr val="tx1">
+                <a:lumMod val="75000"/>
+                <a:lumOff val="25000"/>
+              </a:schemeClr>
+            </a:solidFill>
+          </a:ln>
+        </p:spPr>
+        <p:style>
+          <a:lnRef idx="1">
+            <a:schemeClr val="accent1"/>
+          </a:lnRef>
+          <a:fillRef idx="0">
+            <a:schemeClr val="accent1"/>
+          </a:fillRef>
+          <a:effectRef idx="0">
+            <a:schemeClr val="accent1"/>
+          </a:effectRef>
+          <a:fontRef idx="minor">
+            <a:schemeClr val="tx1"/>
+          </a:fontRef>
+        </p:style>
+      </p:cxnSp>
+      <p:sp>
+        <p:nvSpPr>
+          <p:cNvPr id="3" name="Content Placeholder 2">
+            <a:extLst>
+              <a:ext uri="{FF2B5EF4-FFF2-40B4-BE49-F238E27FC236}">
+                <a16:creationId xmlns:a16="http://schemas.microsoft.com/office/drawing/2014/main" id="{30FFCAFF-CB1D-4AA5-B3A1-5436F7989E5D}"/>
+              </a:ext>
+            </a:extLst>
+          </p:cNvPr>
+          <p:cNvSpPr>
+            <a:spLocks noGrp="1"/>
+          </p:cNvSpPr>
+          <p:nvPr>
+            <p:ph idx="1"/>
+          </p:nvPr>
+        </p:nvSpPr>
+        <p:spPr>
+          <a:xfrm>
+            <a:off x="5255260" y="1648870"/>
+            <a:ext cx="4702848" cy="3560260"/>
+          </a:xfrm>
+        </p:spPr>
+        <p:txBody>
+          <a:bodyPr anchor="ctr">
+            <a:normAutofit/>
+          </a:bodyPr>
+          <a:lstStyle/>
+          <a:p>
+            <a:r>
+              <a:rPr lang="en-GB" sz="2400"/>
+              <a:t>Agile – Scrum, Kanban </a:t>
+            </a:r>
+            <a:r>
+              <a:rPr lang="en-GB" sz="2400" b="1"/>
+              <a:t>(Jira)</a:t>
+            </a:r>
+          </a:p>
+          <a:p>
+            <a:r>
+              <a:rPr lang="en-GB" sz="2400"/>
+              <a:t>Source Control – </a:t>
+            </a:r>
+            <a:r>
+              <a:rPr lang="en-GB" sz="2400" b="1"/>
+              <a:t>Git</a:t>
+            </a:r>
+            <a:r>
+              <a:rPr lang="en-GB" sz="2400"/>
+              <a:t>, </a:t>
+            </a:r>
+            <a:r>
+              <a:rPr lang="en-GB" sz="2400" b="1"/>
+              <a:t>GitHub</a:t>
+            </a:r>
+          </a:p>
+          <a:p>
+            <a:r>
+              <a:rPr lang="en-GB" sz="2400"/>
+              <a:t>Cloud – GCP</a:t>
+            </a:r>
+          </a:p>
+          <a:p>
+            <a:r>
+              <a:rPr lang="en-GB" sz="2400"/>
+              <a:t>Database – </a:t>
+            </a:r>
+            <a:r>
+              <a:rPr lang="en-GB" sz="2400" b="1"/>
+              <a:t>MYSQL</a:t>
+            </a:r>
+          </a:p>
+          <a:p>
+            <a:r>
+              <a:rPr lang="en-GB" sz="2400"/>
+              <a:t>Programming Language – </a:t>
+            </a:r>
+            <a:r>
+              <a:rPr lang="en-GB" sz="2400" b="1"/>
+              <a:t>Java</a:t>
+            </a:r>
+          </a:p>
+          <a:p>
+            <a:r>
+              <a:rPr lang="en-GB" sz="2400"/>
+              <a:t>Build Tool – </a:t>
+            </a:r>
+            <a:r>
+              <a:rPr lang="en-GB" sz="2400" b="1"/>
+              <a:t>Maven</a:t>
+            </a:r>
+          </a:p>
+          <a:p>
+            <a:r>
+              <a:rPr lang="en-GB" sz="2400"/>
+              <a:t>Testing - </a:t>
+            </a:r>
+            <a:r>
+              <a:rPr lang="en-GB" sz="2400" b="1"/>
+              <a:t>JUnit</a:t>
+            </a:r>
+          </a:p>
+        </p:txBody>
+      </p:sp>
+    </p:spTree>
+    <p:extLst>
+      <p:ext uri="{BB962C8B-B14F-4D97-AF65-F5344CB8AC3E}">
+        <p14:creationId xmlns:p14="http://schemas.microsoft.com/office/powerpoint/2010/main" val="391058777"/>
+      </p:ext>
+    </p:extLst>
+  </p:cSld>
+  <p:clrMapOvr>
+    <a:masterClrMapping/>
+  </p:clrMapOvr>
+</p:sld>
+</file>
+
+<file path=ppt/slides/slide4.xml><?xml version="1.0" encoding="utf-8"?>
+<p:sld xmlns:a="http://schemas.openxmlformats.org/drawingml/2006/main" xmlns:r="http://schemas.openxmlformats.org/officeDocument/2006/relationships" xmlns:p="http://schemas.openxmlformats.org/presentationml/2006/main">
+  <p:cSld>
+    <p:spTree>
+      <p:nvGrpSpPr>
+        <p:cNvPr id="1" name=""/>
+        <p:cNvGrpSpPr/>
+        <p:nvPr/>
+      </p:nvGrpSpPr>
+      <p:grpSpPr>
+        <a:xfrm>
+          <a:off x="0" y="0"/>
+          <a:ext cx="0" cy="0"/>
+          <a:chOff x="0" y="0"/>
+          <a:chExt cx="0" cy="0"/>
+        </a:xfrm>
+      </p:grpSpPr>
+      <p:sp>
+        <p:nvSpPr>
+          <p:cNvPr id="6" name="Rectangle: Rounded Corners 5">
+            <a:extLst>
+              <a:ext uri="{FF2B5EF4-FFF2-40B4-BE49-F238E27FC236}">
+                <a16:creationId xmlns:a16="http://schemas.microsoft.com/office/drawing/2014/main" id="{0EC3879F-BF7F-48DE-9D99-A6D84981FB51}"/>
+              </a:ext>
+            </a:extLst>
+          </p:cNvPr>
+          <p:cNvSpPr/>
+          <p:nvPr/>
+        </p:nvSpPr>
+        <p:spPr>
+          <a:xfrm>
+            <a:off x="1879600" y="1261696"/>
+            <a:ext cx="1453662" cy="679938"/>
+          </a:xfrm>
+          <a:prstGeom prst="roundRect">
+            <a:avLst/>
+          </a:prstGeom>
+        </p:spPr>
+        <p:style>
+          <a:lnRef idx="2">
+            <a:schemeClr val="accent1">
+              <a:shade val="50000"/>
+            </a:schemeClr>
+          </a:lnRef>
+          <a:fillRef idx="1">
+            <a:schemeClr val="accent1"/>
+          </a:fillRef>
+          <a:effectRef idx="0">
+            <a:schemeClr val="accent1"/>
+          </a:effectRef>
+          <a:fontRef idx="minor">
+            <a:schemeClr val="lt1"/>
+          </a:fontRef>
+        </p:style>
+        <p:txBody>
+          <a:bodyPr rtlCol="0" anchor="ctr"/>
+          <a:lstStyle/>
+          <a:p>
+            <a:pPr algn="ctr"/>
+            <a:r>
+              <a:rPr lang="en-GB" dirty="0"/>
+              <a:t>Source Code</a:t>
+            </a:r>
+          </a:p>
+        </p:txBody>
+      </p:sp>
+      <p:sp>
+        <p:nvSpPr>
+          <p:cNvPr id="8" name="Rectangle: Rounded Corners 7">
+            <a:extLst>
+              <a:ext uri="{FF2B5EF4-FFF2-40B4-BE49-F238E27FC236}">
+                <a16:creationId xmlns:a16="http://schemas.microsoft.com/office/drawing/2014/main" id="{C5E4C87D-1132-454D-AC66-75C86D020BB9}"/>
+              </a:ext>
+            </a:extLst>
+          </p:cNvPr>
+          <p:cNvSpPr/>
+          <p:nvPr/>
+        </p:nvSpPr>
+        <p:spPr>
+          <a:xfrm>
+            <a:off x="5380891" y="1177680"/>
+            <a:ext cx="1637324" cy="847970"/>
+          </a:xfrm>
+          <a:prstGeom prst="roundRect">
+            <a:avLst/>
+          </a:prstGeom>
+        </p:spPr>
+        <p:style>
+          <a:lnRef idx="2">
+            <a:schemeClr val="accent1">
+              <a:shade val="50000"/>
+            </a:schemeClr>
+          </a:lnRef>
+          <a:fillRef idx="1">
+            <a:schemeClr val="accent1"/>
+          </a:fillRef>
+          <a:effectRef idx="0">
+            <a:schemeClr val="accent1"/>
+          </a:effectRef>
+          <a:fontRef idx="minor">
+            <a:schemeClr val="lt1"/>
+          </a:fontRef>
+        </p:style>
+        <p:txBody>
+          <a:bodyPr rtlCol="0" anchor="ctr"/>
+          <a:lstStyle/>
+          <a:p>
+            <a:pPr algn="ctr"/>
+            <a:r>
+              <a:rPr lang="en-GB" dirty="0"/>
+              <a:t>Version Control System</a:t>
+            </a:r>
+          </a:p>
+        </p:txBody>
+      </p:sp>
+      <p:sp>
+        <p:nvSpPr>
+          <p:cNvPr id="10" name="Rectangle: Rounded Corners 9">
+            <a:extLst>
+              <a:ext uri="{FF2B5EF4-FFF2-40B4-BE49-F238E27FC236}">
+                <a16:creationId xmlns:a16="http://schemas.microsoft.com/office/drawing/2014/main" id="{B293D816-F9CB-495C-9DE3-0FFC8175B800}"/>
+              </a:ext>
+            </a:extLst>
+          </p:cNvPr>
+          <p:cNvSpPr/>
+          <p:nvPr/>
+        </p:nvSpPr>
+        <p:spPr>
+          <a:xfrm>
+            <a:off x="9065844" y="1177680"/>
+            <a:ext cx="1637324" cy="847970"/>
+          </a:xfrm>
+          <a:prstGeom prst="roundRect">
+            <a:avLst/>
+          </a:prstGeom>
+        </p:spPr>
+        <p:style>
+          <a:lnRef idx="2">
+            <a:schemeClr val="accent1">
+              <a:shade val="50000"/>
+            </a:schemeClr>
+          </a:lnRef>
+          <a:fillRef idx="1">
+            <a:schemeClr val="accent1"/>
+          </a:fillRef>
+          <a:effectRef idx="0">
+            <a:schemeClr val="accent1"/>
+          </a:effectRef>
+          <a:fontRef idx="minor">
+            <a:schemeClr val="lt1"/>
+          </a:fontRef>
+        </p:style>
+        <p:txBody>
+          <a:bodyPr rtlCol="0" anchor="ctr"/>
+          <a:lstStyle/>
+          <a:p>
+            <a:pPr algn="ctr"/>
+            <a:r>
+              <a:rPr lang="en-GB" dirty="0"/>
+              <a:t>Project Tracking</a:t>
+            </a:r>
+          </a:p>
+        </p:txBody>
+      </p:sp>
+      <p:sp>
+        <p:nvSpPr>
+          <p:cNvPr id="12" name="Rectangle: Rounded Corners 11">
+            <a:extLst>
+              <a:ext uri="{FF2B5EF4-FFF2-40B4-BE49-F238E27FC236}">
+                <a16:creationId xmlns:a16="http://schemas.microsoft.com/office/drawing/2014/main" id="{5AB3D61F-B522-4D47-8941-19BA0E274AF8}"/>
+              </a:ext>
+            </a:extLst>
+          </p:cNvPr>
+          <p:cNvSpPr/>
+          <p:nvPr/>
+        </p:nvSpPr>
+        <p:spPr>
+          <a:xfrm>
+            <a:off x="5380891" y="3336704"/>
+            <a:ext cx="1637324" cy="847970"/>
+          </a:xfrm>
+          <a:prstGeom prst="roundRect">
+            <a:avLst/>
+          </a:prstGeom>
+        </p:spPr>
+        <p:style>
+          <a:lnRef idx="2">
+            <a:schemeClr val="accent1">
+              <a:shade val="50000"/>
+            </a:schemeClr>
+          </a:lnRef>
+          <a:fillRef idx="1">
+            <a:schemeClr val="accent1"/>
+          </a:fillRef>
+          <a:effectRef idx="0">
+            <a:schemeClr val="accent1"/>
+          </a:effectRef>
+          <a:fontRef idx="minor">
+            <a:schemeClr val="lt1"/>
+          </a:fontRef>
+        </p:style>
+        <p:txBody>
+          <a:bodyPr rtlCol="0" anchor="ctr"/>
+          <a:lstStyle/>
+          <a:p>
+            <a:pPr algn="ctr"/>
+            <a:r>
+              <a:rPr lang="en-GB" dirty="0"/>
+              <a:t>CI Server</a:t>
+            </a:r>
+          </a:p>
+        </p:txBody>
+      </p:sp>
+      <p:sp>
+        <p:nvSpPr>
+          <p:cNvPr id="14" name="Rectangle: Rounded Corners 13">
+            <a:extLst>
+              <a:ext uri="{FF2B5EF4-FFF2-40B4-BE49-F238E27FC236}">
+                <a16:creationId xmlns:a16="http://schemas.microsoft.com/office/drawing/2014/main" id="{C8AE369E-AA78-47C6-B5DC-2E640084532C}"/>
+              </a:ext>
+            </a:extLst>
+          </p:cNvPr>
+          <p:cNvSpPr/>
+          <p:nvPr/>
+        </p:nvSpPr>
+        <p:spPr>
+          <a:xfrm>
+            <a:off x="9065846" y="3336704"/>
+            <a:ext cx="1637324" cy="847970"/>
+          </a:xfrm>
+          <a:prstGeom prst="roundRect">
+            <a:avLst/>
+          </a:prstGeom>
+        </p:spPr>
+        <p:style>
+          <a:lnRef idx="2">
+            <a:schemeClr val="accent1">
+              <a:shade val="50000"/>
+            </a:schemeClr>
+          </a:lnRef>
+          <a:fillRef idx="1">
+            <a:schemeClr val="accent1"/>
+          </a:fillRef>
+          <a:effectRef idx="0">
+            <a:schemeClr val="accent1"/>
+          </a:effectRef>
+          <a:fontRef idx="minor">
+            <a:schemeClr val="lt1"/>
+          </a:fontRef>
+        </p:style>
+        <p:txBody>
+          <a:bodyPr rtlCol="0" anchor="ctr"/>
+          <a:lstStyle/>
+          <a:p>
+            <a:pPr algn="ctr"/>
+            <a:r>
+              <a:rPr lang="en-GB" dirty="0"/>
+              <a:t>Build Tool</a:t>
+            </a:r>
+          </a:p>
+        </p:txBody>
+      </p:sp>
+      <p:sp>
+        <p:nvSpPr>
+          <p:cNvPr id="16" name="Rectangle: Rounded Corners 15">
+            <a:extLst>
+              <a:ext uri="{FF2B5EF4-FFF2-40B4-BE49-F238E27FC236}">
+                <a16:creationId xmlns:a16="http://schemas.microsoft.com/office/drawing/2014/main" id="{72FAB1E7-9C0E-4A28-9971-6423E841503A}"/>
+              </a:ext>
+            </a:extLst>
+          </p:cNvPr>
+          <p:cNvSpPr/>
+          <p:nvPr/>
+        </p:nvSpPr>
+        <p:spPr>
+          <a:xfrm>
+            <a:off x="9065844" y="5410224"/>
+            <a:ext cx="1637324" cy="847970"/>
+          </a:xfrm>
+          <a:prstGeom prst="roundRect">
+            <a:avLst/>
+          </a:prstGeom>
+        </p:spPr>
+        <p:style>
+          <a:lnRef idx="2">
+            <a:schemeClr val="accent1">
+              <a:shade val="50000"/>
+            </a:schemeClr>
+          </a:lnRef>
+          <a:fillRef idx="1">
+            <a:schemeClr val="accent1"/>
+          </a:fillRef>
+          <a:effectRef idx="0">
+            <a:schemeClr val="accent1"/>
+          </a:effectRef>
+          <a:fontRef idx="minor">
+            <a:schemeClr val="lt1"/>
+          </a:fontRef>
+        </p:style>
+        <p:txBody>
+          <a:bodyPr rtlCol="0" anchor="ctr"/>
+          <a:lstStyle/>
+          <a:p>
+            <a:pPr algn="ctr"/>
+            <a:r>
+              <a:rPr lang="en-GB" dirty="0"/>
+              <a:t>Automated Testing</a:t>
+            </a:r>
+          </a:p>
+        </p:txBody>
+      </p:sp>
+      <p:sp>
+        <p:nvSpPr>
+          <p:cNvPr id="18" name="Rectangle: Rounded Corners 17">
+            <a:extLst>
+              <a:ext uri="{FF2B5EF4-FFF2-40B4-BE49-F238E27FC236}">
+                <a16:creationId xmlns:a16="http://schemas.microsoft.com/office/drawing/2014/main" id="{EEB36536-C678-4DF4-9C24-78367EA62D61}"/>
+              </a:ext>
+            </a:extLst>
+          </p:cNvPr>
+          <p:cNvSpPr/>
+          <p:nvPr/>
+        </p:nvSpPr>
+        <p:spPr>
+          <a:xfrm>
+            <a:off x="173892" y="3251200"/>
+            <a:ext cx="1637324" cy="847970"/>
+          </a:xfrm>
+          <a:prstGeom prst="roundRect">
+            <a:avLst/>
+          </a:prstGeom>
+        </p:spPr>
+        <p:style>
+          <a:lnRef idx="2">
+            <a:schemeClr val="accent1">
+              <a:shade val="50000"/>
+            </a:schemeClr>
+          </a:lnRef>
+          <a:fillRef idx="1">
+            <a:schemeClr val="accent1"/>
+          </a:fillRef>
+          <a:effectRef idx="0">
+            <a:schemeClr val="accent1"/>
+          </a:effectRef>
+          <a:fontRef idx="minor">
+            <a:schemeClr val="lt1"/>
+          </a:fontRef>
+        </p:style>
+        <p:txBody>
+          <a:bodyPr rtlCol="0" anchor="ctr"/>
+          <a:lstStyle/>
+          <a:p>
+            <a:pPr algn="ctr"/>
+            <a:r>
+              <a:rPr lang="en-GB" dirty="0"/>
+              <a:t>Database Server</a:t>
+            </a:r>
+          </a:p>
+        </p:txBody>
+      </p:sp>
+      <p:sp>
+        <p:nvSpPr>
+          <p:cNvPr id="19" name="TextBox 18">
+            <a:extLst>
+              <a:ext uri="{FF2B5EF4-FFF2-40B4-BE49-F238E27FC236}">
+                <a16:creationId xmlns:a16="http://schemas.microsoft.com/office/drawing/2014/main" id="{DCCFE37D-5944-42CE-9923-F3C690E4EE8E}"/>
+              </a:ext>
+            </a:extLst>
+          </p:cNvPr>
+          <p:cNvSpPr txBox="1"/>
+          <p:nvPr/>
+        </p:nvSpPr>
+        <p:spPr>
+          <a:xfrm>
+            <a:off x="2289908" y="2025650"/>
+            <a:ext cx="633046" cy="369332"/>
+          </a:xfrm>
+          <a:prstGeom prst="rect">
+            <a:avLst/>
+          </a:prstGeom>
+          <a:noFill/>
+        </p:spPr>
+        <p:txBody>
+          <a:bodyPr wrap="square" rtlCol="0">
+            <a:spAutoFit/>
+          </a:bodyPr>
+          <a:lstStyle/>
+          <a:p>
+            <a:r>
+              <a:rPr lang="en-GB" b="1" dirty="0"/>
+              <a:t>Java</a:t>
+            </a:r>
+          </a:p>
+        </p:txBody>
+      </p:sp>
+      <p:sp>
+        <p:nvSpPr>
+          <p:cNvPr id="21" name="TextBox 20">
+            <a:extLst>
+              <a:ext uri="{FF2B5EF4-FFF2-40B4-BE49-F238E27FC236}">
+                <a16:creationId xmlns:a16="http://schemas.microsoft.com/office/drawing/2014/main" id="{9219971B-8964-4FCB-8A9F-A43624FDD43F}"/>
+              </a:ext>
+            </a:extLst>
+          </p:cNvPr>
+          <p:cNvSpPr txBox="1"/>
+          <p:nvPr/>
+        </p:nvSpPr>
+        <p:spPr>
+          <a:xfrm>
+            <a:off x="5581160" y="2114494"/>
+            <a:ext cx="1236785" cy="369332"/>
+          </a:xfrm>
+          <a:prstGeom prst="rect">
+            <a:avLst/>
+          </a:prstGeom>
+          <a:noFill/>
+        </p:spPr>
+        <p:txBody>
+          <a:bodyPr wrap="square" rtlCol="0">
+            <a:spAutoFit/>
+          </a:bodyPr>
+          <a:lstStyle/>
+          <a:p>
+            <a:r>
+              <a:rPr lang="en-GB" b="1" dirty="0"/>
+              <a:t>Git/GitHub</a:t>
+            </a:r>
+          </a:p>
+        </p:txBody>
+      </p:sp>
+      <p:sp>
+        <p:nvSpPr>
+          <p:cNvPr id="23" name="TextBox 22">
+            <a:extLst>
+              <a:ext uri="{FF2B5EF4-FFF2-40B4-BE49-F238E27FC236}">
+                <a16:creationId xmlns:a16="http://schemas.microsoft.com/office/drawing/2014/main" id="{C46D435E-525E-40FA-999A-2CDD43DE6F11}"/>
+              </a:ext>
+            </a:extLst>
+          </p:cNvPr>
+          <p:cNvSpPr txBox="1"/>
+          <p:nvPr/>
+        </p:nvSpPr>
+        <p:spPr>
+          <a:xfrm>
+            <a:off x="9630019" y="2072541"/>
+            <a:ext cx="508977" cy="369332"/>
+          </a:xfrm>
+          <a:prstGeom prst="rect">
+            <a:avLst/>
+          </a:prstGeom>
+          <a:noFill/>
+        </p:spPr>
+        <p:txBody>
+          <a:bodyPr wrap="square" rtlCol="0">
+            <a:spAutoFit/>
+          </a:bodyPr>
+          <a:lstStyle/>
+          <a:p>
+            <a:r>
+              <a:rPr lang="en-GB" b="1" dirty="0"/>
+              <a:t>Jira</a:t>
+            </a:r>
+          </a:p>
+        </p:txBody>
+      </p:sp>
+      <p:sp>
+        <p:nvSpPr>
+          <p:cNvPr id="25" name="TextBox 24">
+            <a:extLst>
+              <a:ext uri="{FF2B5EF4-FFF2-40B4-BE49-F238E27FC236}">
+                <a16:creationId xmlns:a16="http://schemas.microsoft.com/office/drawing/2014/main" id="{5BA0BE65-1ED7-40FA-9EFA-1DD3294D4EC5}"/>
+              </a:ext>
+            </a:extLst>
+          </p:cNvPr>
+          <p:cNvSpPr txBox="1"/>
+          <p:nvPr/>
+        </p:nvSpPr>
+        <p:spPr>
+          <a:xfrm>
+            <a:off x="560754" y="4198817"/>
+            <a:ext cx="863600" cy="369332"/>
+          </a:xfrm>
+          <a:prstGeom prst="rect">
+            <a:avLst/>
+          </a:prstGeom>
+          <a:noFill/>
+        </p:spPr>
+        <p:txBody>
+          <a:bodyPr wrap="square" rtlCol="0">
+            <a:spAutoFit/>
+          </a:bodyPr>
+          <a:lstStyle/>
+          <a:p>
+            <a:r>
+              <a:rPr lang="en-GB" b="1" dirty="0"/>
+              <a:t>MYSQL</a:t>
+            </a:r>
+          </a:p>
+        </p:txBody>
+      </p:sp>
+      <p:sp>
+        <p:nvSpPr>
+          <p:cNvPr id="27" name="TextBox 26">
+            <a:extLst>
+              <a:ext uri="{FF2B5EF4-FFF2-40B4-BE49-F238E27FC236}">
+                <a16:creationId xmlns:a16="http://schemas.microsoft.com/office/drawing/2014/main" id="{411202B2-1745-4376-8C40-162CA56159F1}"/>
+              </a:ext>
+            </a:extLst>
+          </p:cNvPr>
+          <p:cNvSpPr txBox="1"/>
+          <p:nvPr/>
+        </p:nvSpPr>
+        <p:spPr>
+          <a:xfrm>
+            <a:off x="9452707" y="4282423"/>
+            <a:ext cx="863600" cy="369332"/>
+          </a:xfrm>
+          <a:prstGeom prst="rect">
+            <a:avLst/>
+          </a:prstGeom>
+          <a:noFill/>
+        </p:spPr>
+        <p:txBody>
+          <a:bodyPr wrap="square" rtlCol="0">
+            <a:spAutoFit/>
+          </a:bodyPr>
+          <a:lstStyle/>
+          <a:p>
+            <a:r>
+              <a:rPr lang="en-GB" b="1" dirty="0"/>
+              <a:t>Maven</a:t>
+            </a:r>
+          </a:p>
+        </p:txBody>
+      </p:sp>
+      <p:sp>
+        <p:nvSpPr>
+          <p:cNvPr id="29" name="TextBox 28">
+            <a:extLst>
+              <a:ext uri="{FF2B5EF4-FFF2-40B4-BE49-F238E27FC236}">
+                <a16:creationId xmlns:a16="http://schemas.microsoft.com/office/drawing/2014/main" id="{39330EE3-CA14-4991-8C10-3C3579E794A7}"/>
+              </a:ext>
+            </a:extLst>
+          </p:cNvPr>
+          <p:cNvSpPr txBox="1"/>
+          <p:nvPr/>
+        </p:nvSpPr>
+        <p:spPr>
+          <a:xfrm>
+            <a:off x="9567984" y="6330506"/>
+            <a:ext cx="748323" cy="369332"/>
+          </a:xfrm>
+          <a:prstGeom prst="rect">
+            <a:avLst/>
+          </a:prstGeom>
+          <a:noFill/>
+        </p:spPr>
+        <p:txBody>
+          <a:bodyPr wrap="square" rtlCol="0">
+            <a:spAutoFit/>
+          </a:bodyPr>
+          <a:lstStyle/>
+          <a:p>
+            <a:r>
+              <a:rPr lang="en-GB" b="1" dirty="0"/>
+              <a:t>JUnit</a:t>
+            </a:r>
+          </a:p>
+        </p:txBody>
+      </p:sp>
+      <p:cxnSp>
+        <p:nvCxnSpPr>
+          <p:cNvPr id="31" name="Straight Arrow Connector 30">
+            <a:extLst>
+              <a:ext uri="{FF2B5EF4-FFF2-40B4-BE49-F238E27FC236}">
+                <a16:creationId xmlns:a16="http://schemas.microsoft.com/office/drawing/2014/main" id="{09264302-9169-4ABC-AC64-782B81E2B150}"/>
+              </a:ext>
+            </a:extLst>
+          </p:cNvPr>
+          <p:cNvCxnSpPr/>
+          <p:nvPr/>
+        </p:nvCxnSpPr>
+        <p:spPr>
+          <a:xfrm>
+            <a:off x="3462215" y="1430215"/>
+            <a:ext cx="1633416" cy="0"/>
+          </a:xfrm>
+          <a:prstGeom prst="straightConnector1">
+            <a:avLst/>
+          </a:prstGeom>
+          <a:ln>
+            <a:tailEnd type="triangle"/>
+          </a:ln>
+        </p:spPr>
+        <p:style>
+          <a:lnRef idx="1">
+            <a:schemeClr val="accent1"/>
+          </a:lnRef>
+          <a:fillRef idx="0">
+            <a:schemeClr val="accent1"/>
+          </a:fillRef>
+          <a:effectRef idx="0">
+            <a:schemeClr val="accent1"/>
+          </a:effectRef>
+          <a:fontRef idx="minor">
+            <a:schemeClr val="tx1"/>
+          </a:fontRef>
+        </p:style>
+      </p:cxnSp>
+      <p:cxnSp>
+        <p:nvCxnSpPr>
+          <p:cNvPr id="32" name="Straight Arrow Connector 31">
+            <a:extLst>
+              <a:ext uri="{FF2B5EF4-FFF2-40B4-BE49-F238E27FC236}">
+                <a16:creationId xmlns:a16="http://schemas.microsoft.com/office/drawing/2014/main" id="{AF0808B3-E285-4C2C-93EA-7C4AA8152799}"/>
+              </a:ext>
+            </a:extLst>
+          </p:cNvPr>
+          <p:cNvCxnSpPr/>
+          <p:nvPr/>
+        </p:nvCxnSpPr>
+        <p:spPr>
+          <a:xfrm>
+            <a:off x="7217507" y="1441938"/>
+            <a:ext cx="1633416" cy="0"/>
+          </a:xfrm>
+          <a:prstGeom prst="straightConnector1">
+            <a:avLst/>
+          </a:prstGeom>
+          <a:ln>
+            <a:tailEnd type="triangle"/>
+          </a:ln>
+        </p:spPr>
+        <p:style>
+          <a:lnRef idx="1">
+            <a:schemeClr val="accent1"/>
+          </a:lnRef>
+          <a:fillRef idx="0">
+            <a:schemeClr val="accent1"/>
+          </a:fillRef>
+          <a:effectRef idx="0">
+            <a:schemeClr val="accent1"/>
+          </a:effectRef>
+          <a:fontRef idx="minor">
+            <a:schemeClr val="tx1"/>
+          </a:fontRef>
+        </p:style>
+      </p:cxnSp>
+      <p:cxnSp>
+        <p:nvCxnSpPr>
+          <p:cNvPr id="33" name="Straight Arrow Connector 32">
+            <a:extLst>
+              <a:ext uri="{FF2B5EF4-FFF2-40B4-BE49-F238E27FC236}">
+                <a16:creationId xmlns:a16="http://schemas.microsoft.com/office/drawing/2014/main" id="{822A36D7-3FFD-4E58-8AB2-8A0B512FE231}"/>
+              </a:ext>
+            </a:extLst>
+          </p:cNvPr>
+          <p:cNvCxnSpPr/>
+          <p:nvPr/>
+        </p:nvCxnSpPr>
+        <p:spPr>
+          <a:xfrm>
+            <a:off x="7272215" y="3606334"/>
+            <a:ext cx="1633416" cy="0"/>
+          </a:xfrm>
+          <a:prstGeom prst="straightConnector1">
+            <a:avLst/>
+          </a:prstGeom>
+          <a:ln>
+            <a:tailEnd type="triangle"/>
+          </a:ln>
+        </p:spPr>
+        <p:style>
+          <a:lnRef idx="1">
+            <a:schemeClr val="accent1"/>
+          </a:lnRef>
+          <a:fillRef idx="0">
+            <a:schemeClr val="accent1"/>
+          </a:fillRef>
+          <a:effectRef idx="0">
+            <a:schemeClr val="accent1"/>
+          </a:effectRef>
+          <a:fontRef idx="minor">
+            <a:schemeClr val="tx1"/>
+          </a:fontRef>
+        </p:style>
+      </p:cxnSp>
+      <p:cxnSp>
+        <p:nvCxnSpPr>
+          <p:cNvPr id="34" name="Straight Arrow Connector 33">
+            <a:extLst>
+              <a:ext uri="{FF2B5EF4-FFF2-40B4-BE49-F238E27FC236}">
+                <a16:creationId xmlns:a16="http://schemas.microsoft.com/office/drawing/2014/main" id="{5847C02B-2625-4596-9B76-7E07ECC474DF}"/>
+              </a:ext>
+            </a:extLst>
+          </p:cNvPr>
+          <p:cNvCxnSpPr>
+            <a:cxnSpLocks/>
+          </p:cNvCxnSpPr>
+          <p:nvPr/>
+        </p:nvCxnSpPr>
+        <p:spPr>
+          <a:xfrm flipV="1">
+            <a:off x="994508" y="2114494"/>
+            <a:ext cx="693615" cy="1015567"/>
+          </a:xfrm>
+          <a:prstGeom prst="straightConnector1">
+            <a:avLst/>
+          </a:prstGeom>
+          <a:ln>
+            <a:tailEnd type="triangle"/>
+          </a:ln>
+        </p:spPr>
+        <p:style>
+          <a:lnRef idx="1">
+            <a:schemeClr val="accent1"/>
+          </a:lnRef>
+          <a:fillRef idx="0">
+            <a:schemeClr val="accent1"/>
+          </a:fillRef>
+          <a:effectRef idx="0">
+            <a:schemeClr val="accent1"/>
+          </a:effectRef>
+          <a:fontRef idx="minor">
+            <a:schemeClr val="tx1"/>
+          </a:fontRef>
+        </p:style>
+      </p:cxnSp>
+      <p:cxnSp>
+        <p:nvCxnSpPr>
+          <p:cNvPr id="36" name="Straight Arrow Connector 35">
+            <a:extLst>
+              <a:ext uri="{FF2B5EF4-FFF2-40B4-BE49-F238E27FC236}">
+                <a16:creationId xmlns:a16="http://schemas.microsoft.com/office/drawing/2014/main" id="{3EF6C073-64B7-44AE-9FB2-E950B20F2488}"/>
+              </a:ext>
+            </a:extLst>
+          </p:cNvPr>
+          <p:cNvCxnSpPr>
+            <a:cxnSpLocks/>
+          </p:cNvCxnSpPr>
+          <p:nvPr/>
+        </p:nvCxnSpPr>
+        <p:spPr>
+          <a:xfrm flipH="1">
+            <a:off x="3462215" y="1910371"/>
+            <a:ext cx="1633416" cy="1"/>
+          </a:xfrm>
+          <a:prstGeom prst="straightConnector1">
+            <a:avLst/>
+          </a:prstGeom>
+          <a:ln>
+            <a:tailEnd type="triangle"/>
+          </a:ln>
+        </p:spPr>
+        <p:style>
+          <a:lnRef idx="1">
+            <a:schemeClr val="accent1"/>
+          </a:lnRef>
+          <a:fillRef idx="0">
+            <a:schemeClr val="accent1"/>
+          </a:fillRef>
+          <a:effectRef idx="0">
+            <a:schemeClr val="accent1"/>
+          </a:effectRef>
+          <a:fontRef idx="minor">
+            <a:schemeClr val="tx1"/>
+          </a:fontRef>
+        </p:style>
+      </p:cxnSp>
+      <p:cxnSp>
+        <p:nvCxnSpPr>
+          <p:cNvPr id="39" name="Straight Arrow Connector 38">
+            <a:extLst>
+              <a:ext uri="{FF2B5EF4-FFF2-40B4-BE49-F238E27FC236}">
+                <a16:creationId xmlns:a16="http://schemas.microsoft.com/office/drawing/2014/main" id="{6A529FBC-4BEC-4906-8590-10D96E45D219}"/>
+              </a:ext>
+            </a:extLst>
+          </p:cNvPr>
+          <p:cNvCxnSpPr>
+            <a:cxnSpLocks/>
+          </p:cNvCxnSpPr>
+          <p:nvPr/>
+        </p:nvCxnSpPr>
+        <p:spPr>
+          <a:xfrm flipH="1">
+            <a:off x="7217507" y="1910370"/>
+            <a:ext cx="1633416" cy="1"/>
+          </a:xfrm>
+          <a:prstGeom prst="straightConnector1">
+            <a:avLst/>
+          </a:prstGeom>
+          <a:ln>
+            <a:tailEnd type="triangle"/>
+          </a:ln>
+        </p:spPr>
+        <p:style>
+          <a:lnRef idx="1">
+            <a:schemeClr val="accent1"/>
+          </a:lnRef>
+          <a:fillRef idx="0">
+            <a:schemeClr val="accent1"/>
+          </a:fillRef>
+          <a:effectRef idx="0">
+            <a:schemeClr val="accent1"/>
+          </a:effectRef>
+          <a:fontRef idx="minor">
+            <a:schemeClr val="tx1"/>
+          </a:fontRef>
+        </p:style>
+      </p:cxnSp>
+      <p:cxnSp>
+        <p:nvCxnSpPr>
+          <p:cNvPr id="40" name="Straight Arrow Connector 39">
+            <a:extLst>
+              <a:ext uri="{FF2B5EF4-FFF2-40B4-BE49-F238E27FC236}">
+                <a16:creationId xmlns:a16="http://schemas.microsoft.com/office/drawing/2014/main" id="{5850AE12-13FE-4BA3-A11D-A19E120AC455}"/>
+              </a:ext>
+            </a:extLst>
+          </p:cNvPr>
+          <p:cNvCxnSpPr>
+            <a:cxnSpLocks/>
+          </p:cNvCxnSpPr>
+          <p:nvPr/>
+        </p:nvCxnSpPr>
+        <p:spPr>
+          <a:xfrm flipH="1">
+            <a:off x="7217507" y="4074765"/>
+            <a:ext cx="1633416" cy="1"/>
+          </a:xfrm>
+          <a:prstGeom prst="straightConnector1">
+            <a:avLst/>
+          </a:prstGeom>
+          <a:ln>
+            <a:tailEnd type="triangle"/>
+          </a:ln>
+        </p:spPr>
+        <p:style>
+          <a:lnRef idx="1">
+            <a:schemeClr val="accent1"/>
+          </a:lnRef>
+          <a:fillRef idx="0">
+            <a:schemeClr val="accent1"/>
+          </a:fillRef>
+          <a:effectRef idx="0">
+            <a:schemeClr val="accent1"/>
+          </a:effectRef>
+          <a:fontRef idx="minor">
+            <a:schemeClr val="tx1"/>
+          </a:fontRef>
+        </p:style>
+      </p:cxnSp>
+      <p:cxnSp>
+        <p:nvCxnSpPr>
+          <p:cNvPr id="41" name="Straight Arrow Connector 40">
+            <a:extLst>
+              <a:ext uri="{FF2B5EF4-FFF2-40B4-BE49-F238E27FC236}">
+                <a16:creationId xmlns:a16="http://schemas.microsoft.com/office/drawing/2014/main" id="{87772D97-E16B-4515-84F8-0DB7E8A51B64}"/>
+              </a:ext>
+            </a:extLst>
+          </p:cNvPr>
+          <p:cNvCxnSpPr>
+            <a:cxnSpLocks/>
+          </p:cNvCxnSpPr>
+          <p:nvPr/>
+        </p:nvCxnSpPr>
+        <p:spPr>
+          <a:xfrm>
+            <a:off x="9999784" y="4651755"/>
+            <a:ext cx="0" cy="686157"/>
+          </a:xfrm>
+          <a:prstGeom prst="straightConnector1">
+            <a:avLst/>
+          </a:prstGeom>
+          <a:ln>
+            <a:tailEnd type="triangle"/>
+          </a:ln>
+        </p:spPr>
+        <p:style>
+          <a:lnRef idx="1">
+            <a:schemeClr val="accent1"/>
+          </a:lnRef>
+          <a:fillRef idx="0">
+            <a:schemeClr val="accent1"/>
+          </a:fillRef>
+          <a:effectRef idx="0">
+            <a:schemeClr val="accent1"/>
+          </a:effectRef>
+          <a:fontRef idx="minor">
+            <a:schemeClr val="tx1"/>
+          </a:fontRef>
+        </p:style>
+      </p:cxnSp>
+      <p:cxnSp>
+        <p:nvCxnSpPr>
+          <p:cNvPr id="44" name="Straight Arrow Connector 43">
+            <a:extLst>
+              <a:ext uri="{FF2B5EF4-FFF2-40B4-BE49-F238E27FC236}">
+                <a16:creationId xmlns:a16="http://schemas.microsoft.com/office/drawing/2014/main" id="{A06D2270-E5D2-49EA-9307-B240B292AFC0}"/>
+              </a:ext>
+            </a:extLst>
+          </p:cNvPr>
+          <p:cNvCxnSpPr>
+            <a:cxnSpLocks/>
+          </p:cNvCxnSpPr>
+          <p:nvPr/>
+        </p:nvCxnSpPr>
+        <p:spPr>
+          <a:xfrm flipV="1">
+            <a:off x="9710615" y="4651755"/>
+            <a:ext cx="0" cy="686157"/>
+          </a:xfrm>
+          <a:prstGeom prst="straightConnector1">
+            <a:avLst/>
+          </a:prstGeom>
+          <a:ln>
+            <a:tailEnd type="triangle"/>
+          </a:ln>
+        </p:spPr>
+        <p:style>
+          <a:lnRef idx="1">
+            <a:schemeClr val="accent1"/>
+          </a:lnRef>
+          <a:fillRef idx="0">
+            <a:schemeClr val="accent1"/>
+          </a:fillRef>
+          <a:effectRef idx="0">
+            <a:schemeClr val="accent1"/>
+          </a:effectRef>
+          <a:fontRef idx="minor">
+            <a:schemeClr val="tx1"/>
+          </a:fontRef>
+        </p:style>
+      </p:cxnSp>
+      <p:cxnSp>
+        <p:nvCxnSpPr>
+          <p:cNvPr id="49" name="Straight Arrow Connector 48">
+            <a:extLst>
+              <a:ext uri="{FF2B5EF4-FFF2-40B4-BE49-F238E27FC236}">
+                <a16:creationId xmlns:a16="http://schemas.microsoft.com/office/drawing/2014/main" id="{FDCC995E-F27E-4666-8CA6-D8B6C428E755}"/>
+              </a:ext>
+            </a:extLst>
+          </p:cNvPr>
+          <p:cNvCxnSpPr>
+            <a:cxnSpLocks/>
+          </p:cNvCxnSpPr>
+          <p:nvPr/>
+        </p:nvCxnSpPr>
+        <p:spPr>
+          <a:xfrm>
+            <a:off x="6338276" y="2483826"/>
+            <a:ext cx="0" cy="686157"/>
+          </a:xfrm>
+          <a:prstGeom prst="straightConnector1">
+            <a:avLst/>
+          </a:prstGeom>
+          <a:ln>
+            <a:tailEnd type="triangle"/>
+          </a:ln>
+        </p:spPr>
+        <p:style>
+          <a:lnRef idx="1">
+            <a:schemeClr val="accent1"/>
+          </a:lnRef>
+          <a:fillRef idx="0">
+            <a:schemeClr val="accent1"/>
+          </a:fillRef>
+          <a:effectRef idx="0">
+            <a:schemeClr val="accent1"/>
+          </a:effectRef>
+          <a:fontRef idx="minor">
+            <a:schemeClr val="tx1"/>
+          </a:fontRef>
+        </p:style>
+      </p:cxnSp>
+      <p:cxnSp>
+        <p:nvCxnSpPr>
+          <p:cNvPr id="50" name="Straight Arrow Connector 49">
+            <a:extLst>
+              <a:ext uri="{FF2B5EF4-FFF2-40B4-BE49-F238E27FC236}">
+                <a16:creationId xmlns:a16="http://schemas.microsoft.com/office/drawing/2014/main" id="{6E51745A-9A8C-46FF-AC6D-70AE6F128027}"/>
+              </a:ext>
+            </a:extLst>
+          </p:cNvPr>
+          <p:cNvCxnSpPr>
+            <a:cxnSpLocks/>
+          </p:cNvCxnSpPr>
+          <p:nvPr/>
+        </p:nvCxnSpPr>
+        <p:spPr>
+          <a:xfrm flipV="1">
+            <a:off x="6049107" y="2483826"/>
+            <a:ext cx="0" cy="686157"/>
+          </a:xfrm>
+          <a:prstGeom prst="straightConnector1">
+            <a:avLst/>
+          </a:prstGeom>
+          <a:ln>
+            <a:tailEnd type="triangle"/>
+          </a:ln>
+        </p:spPr>
+        <p:style>
+          <a:lnRef idx="1">
+            <a:schemeClr val="accent1"/>
+          </a:lnRef>
+          <a:fillRef idx="0">
+            <a:schemeClr val="accent1"/>
+          </a:fillRef>
+          <a:effectRef idx="0">
+            <a:schemeClr val="accent1"/>
+          </a:effectRef>
+          <a:fontRef idx="minor">
+            <a:schemeClr val="tx1"/>
+          </a:fontRef>
+        </p:style>
+      </p:cxnSp>
+      <p:sp>
+        <p:nvSpPr>
+          <p:cNvPr id="52" name="TextBox 51">
+            <a:extLst>
+              <a:ext uri="{FF2B5EF4-FFF2-40B4-BE49-F238E27FC236}">
+                <a16:creationId xmlns:a16="http://schemas.microsoft.com/office/drawing/2014/main" id="{1C4FB638-E26A-4FD0-8E56-CEF6AD3423E8}"/>
+              </a:ext>
+            </a:extLst>
+          </p:cNvPr>
+          <p:cNvSpPr txBox="1"/>
+          <p:nvPr/>
+        </p:nvSpPr>
+        <p:spPr>
+          <a:xfrm>
+            <a:off x="3970212" y="1095328"/>
+            <a:ext cx="631091" cy="307777"/>
+          </a:xfrm>
+          <a:prstGeom prst="rect">
+            <a:avLst/>
+          </a:prstGeom>
+          <a:noFill/>
+        </p:spPr>
+        <p:txBody>
+          <a:bodyPr wrap="square" rtlCol="0">
+            <a:spAutoFit/>
+          </a:bodyPr>
+          <a:lstStyle/>
+          <a:p>
+            <a:r>
+              <a:rPr lang="en-GB" sz="1400" dirty="0"/>
+              <a:t>Push</a:t>
+            </a:r>
+          </a:p>
+        </p:txBody>
+      </p:sp>
+      <p:sp>
+        <p:nvSpPr>
+          <p:cNvPr id="54" name="TextBox 53">
+            <a:extLst>
+              <a:ext uri="{FF2B5EF4-FFF2-40B4-BE49-F238E27FC236}">
+                <a16:creationId xmlns:a16="http://schemas.microsoft.com/office/drawing/2014/main" id="{32CF7C48-90A7-4CF4-A382-6674A498AA86}"/>
+              </a:ext>
+            </a:extLst>
+          </p:cNvPr>
+          <p:cNvSpPr txBox="1"/>
+          <p:nvPr/>
+        </p:nvSpPr>
+        <p:spPr>
+          <a:xfrm>
+            <a:off x="3963376" y="1964591"/>
+            <a:ext cx="631091" cy="307777"/>
+          </a:xfrm>
+          <a:prstGeom prst="rect">
+            <a:avLst/>
+          </a:prstGeom>
+          <a:noFill/>
+        </p:spPr>
+        <p:txBody>
+          <a:bodyPr wrap="square" rtlCol="0">
+            <a:spAutoFit/>
+          </a:bodyPr>
+          <a:lstStyle/>
+          <a:p>
+            <a:r>
+              <a:rPr lang="en-GB" sz="1400" dirty="0"/>
+              <a:t>Pull</a:t>
+            </a:r>
+          </a:p>
+        </p:txBody>
+      </p:sp>
+      <p:sp>
+        <p:nvSpPr>
+          <p:cNvPr id="56" name="TextBox 55">
+            <a:extLst>
+              <a:ext uri="{FF2B5EF4-FFF2-40B4-BE49-F238E27FC236}">
+                <a16:creationId xmlns:a16="http://schemas.microsoft.com/office/drawing/2014/main" id="{6D9B82CD-F80B-46B9-A7C6-A26D7A7D9780}"/>
+              </a:ext>
+            </a:extLst>
+          </p:cNvPr>
+          <p:cNvSpPr txBox="1"/>
+          <p:nvPr/>
+        </p:nvSpPr>
+        <p:spPr>
+          <a:xfrm>
+            <a:off x="7427789" y="1023791"/>
+            <a:ext cx="1212851" cy="307777"/>
+          </a:xfrm>
+          <a:prstGeom prst="rect">
+            <a:avLst/>
+          </a:prstGeom>
+          <a:noFill/>
+        </p:spPr>
+        <p:txBody>
+          <a:bodyPr wrap="square" rtlCol="0">
+            <a:spAutoFit/>
+          </a:bodyPr>
+          <a:lstStyle/>
+          <a:p>
+            <a:r>
+              <a:rPr lang="en-GB" sz="1400" dirty="0"/>
+              <a:t>Update Work</a:t>
+            </a:r>
+          </a:p>
+        </p:txBody>
+      </p:sp>
+      <p:sp>
+        <p:nvSpPr>
+          <p:cNvPr id="58" name="TextBox 57">
+            <a:extLst>
+              <a:ext uri="{FF2B5EF4-FFF2-40B4-BE49-F238E27FC236}">
+                <a16:creationId xmlns:a16="http://schemas.microsoft.com/office/drawing/2014/main" id="{283F189B-8C4D-4BAC-AAE0-DE91C2267899}"/>
+              </a:ext>
+            </a:extLst>
+          </p:cNvPr>
+          <p:cNvSpPr txBox="1"/>
+          <p:nvPr/>
+        </p:nvSpPr>
+        <p:spPr>
+          <a:xfrm>
+            <a:off x="7586419" y="2099461"/>
+            <a:ext cx="1005007" cy="307777"/>
+          </a:xfrm>
+          <a:prstGeom prst="rect">
+            <a:avLst/>
+          </a:prstGeom>
+          <a:noFill/>
+        </p:spPr>
+        <p:txBody>
+          <a:bodyPr wrap="square" rtlCol="0">
+            <a:spAutoFit/>
+          </a:bodyPr>
+          <a:lstStyle/>
+          <a:p>
+            <a:r>
+              <a:rPr lang="en-GB" sz="1400" dirty="0"/>
+              <a:t>Get Work</a:t>
+            </a:r>
+          </a:p>
+        </p:txBody>
+      </p:sp>
+      <p:sp>
+        <p:nvSpPr>
+          <p:cNvPr id="60" name="TextBox 59">
+            <a:extLst>
+              <a:ext uri="{FF2B5EF4-FFF2-40B4-BE49-F238E27FC236}">
+                <a16:creationId xmlns:a16="http://schemas.microsoft.com/office/drawing/2014/main" id="{48D825ED-432D-4281-84D1-50A06CA331F4}"/>
+              </a:ext>
+            </a:extLst>
+          </p:cNvPr>
+          <p:cNvSpPr txBox="1"/>
+          <p:nvPr/>
+        </p:nvSpPr>
+        <p:spPr>
+          <a:xfrm>
+            <a:off x="8617195" y="4943143"/>
+            <a:ext cx="1047251" cy="307777"/>
+          </a:xfrm>
+          <a:prstGeom prst="rect">
+            <a:avLst/>
+          </a:prstGeom>
+          <a:noFill/>
+        </p:spPr>
+        <p:txBody>
+          <a:bodyPr wrap="square" rtlCol="0">
+            <a:spAutoFit/>
+          </a:bodyPr>
+          <a:lstStyle/>
+          <a:p>
+            <a:r>
+              <a:rPr lang="en-GB" sz="1400" dirty="0"/>
+              <a:t>Test Results</a:t>
+            </a:r>
+          </a:p>
+        </p:txBody>
+      </p:sp>
+      <p:sp>
+        <p:nvSpPr>
+          <p:cNvPr id="62" name="TextBox 61">
+            <a:extLst>
+              <a:ext uri="{FF2B5EF4-FFF2-40B4-BE49-F238E27FC236}">
+                <a16:creationId xmlns:a16="http://schemas.microsoft.com/office/drawing/2014/main" id="{47F0ED84-D64E-4181-AEB3-F19D072288A4}"/>
+              </a:ext>
+            </a:extLst>
+          </p:cNvPr>
+          <p:cNvSpPr txBox="1"/>
+          <p:nvPr/>
+        </p:nvSpPr>
+        <p:spPr>
+          <a:xfrm>
+            <a:off x="10138996" y="4943143"/>
+            <a:ext cx="1005741" cy="307777"/>
+          </a:xfrm>
+          <a:prstGeom prst="rect">
+            <a:avLst/>
+          </a:prstGeom>
+          <a:noFill/>
+        </p:spPr>
+        <p:txBody>
+          <a:bodyPr wrap="square" rtlCol="0">
+            <a:spAutoFit/>
+          </a:bodyPr>
+          <a:lstStyle/>
+          <a:p>
+            <a:r>
+              <a:rPr lang="en-GB" sz="1400" dirty="0"/>
+              <a:t>Send Tests</a:t>
+            </a:r>
+          </a:p>
+        </p:txBody>
+      </p:sp>
+      <p:sp>
+        <p:nvSpPr>
+          <p:cNvPr id="63" name="Title 1">
+            <a:extLst>
+              <a:ext uri="{FF2B5EF4-FFF2-40B4-BE49-F238E27FC236}">
+                <a16:creationId xmlns:a16="http://schemas.microsoft.com/office/drawing/2014/main" id="{54842D76-68EE-4DA6-8C03-76463EADB9E4}"/>
+              </a:ext>
+            </a:extLst>
+          </p:cNvPr>
+          <p:cNvSpPr>
+            <a:spLocks noGrp="1"/>
+          </p:cNvSpPr>
+          <p:nvPr>
+            <p:ph type="title"/>
+          </p:nvPr>
+        </p:nvSpPr>
+        <p:spPr>
+          <a:xfrm>
+            <a:off x="1340336" y="5045157"/>
+            <a:ext cx="3974121" cy="1285349"/>
+          </a:xfrm>
+        </p:spPr>
+        <p:txBody>
+          <a:bodyPr vert="horz" lIns="91440" tIns="45720" rIns="91440" bIns="45720" rtlCol="0" anchor="b">
+            <a:normAutofit fontScale="90000"/>
+          </a:bodyPr>
+          <a:lstStyle/>
+          <a:p>
+            <a:pPr algn="ctr"/>
+            <a:r>
+              <a:rPr lang="en-US" sz="6600" u="sng" dirty="0"/>
+              <a:t>CI PIPELINE</a:t>
+            </a:r>
+          </a:p>
+        </p:txBody>
+      </p:sp>
+    </p:spTree>
+    <p:extLst>
+      <p:ext uri="{BB962C8B-B14F-4D97-AF65-F5344CB8AC3E}">
+        <p14:creationId xmlns:p14="http://schemas.microsoft.com/office/powerpoint/2010/main" val="3449752075"/>
       </p:ext>
     </p:extLst>
   </p:cSld>

</xml_diff>

<commit_message>
working application and JUnit tests
</commit_message>
<xml_diff>
--- a/documentation/IMS-Presentation.pptx
+++ b/documentation/IMS-Presentation.pptx
@@ -7,8 +7,11 @@
   <p:sldIdLst>
     <p:sldId id="256" r:id="rId2"/>
     <p:sldId id="257" r:id="rId3"/>
-    <p:sldId id="258" r:id="rId4"/>
-    <p:sldId id="259" r:id="rId5"/>
+    <p:sldId id="261" r:id="rId4"/>
+    <p:sldId id="258" r:id="rId5"/>
+    <p:sldId id="260" r:id="rId6"/>
+    <p:sldId id="259" r:id="rId7"/>
+    <p:sldId id="262" r:id="rId8"/>
   </p:sldIdLst>
   <p:sldSz cx="12192000" cy="6858000"/>
   <p:notesSz cx="6858000" cy="9144000"/>
@@ -3817,7 +3820,7 @@
       </p:grpSpPr>
       <p:sp>
         <p:nvSpPr>
-          <p:cNvPr id="10" name="Rectangle 9">
+          <p:cNvPr id="33" name="Rectangle 32">
             <a:extLst>
               <a:ext uri="{FF2B5EF4-FFF2-40B4-BE49-F238E27FC236}">
                 <a16:creationId xmlns:a16="http://schemas.microsoft.com/office/drawing/2014/main" id="{823AC064-BC96-4F32-8AE1-B2FD38754823}"/>
@@ -3910,7 +3913,7 @@
           <a:p>
             <a:pPr algn="ctr"/>
             <a:r>
-              <a:rPr lang="en-US" sz="5400" dirty="0">
+              <a:rPr lang="en-US" sz="5400">
                 <a:solidFill>
                   <a:srgbClr val="FFFFFF"/>
                 </a:solidFill>
@@ -3922,7 +3925,7 @@
       </p:sp>
       <p:cxnSp>
         <p:nvCxnSpPr>
-          <p:cNvPr id="12" name="Straight Connector 11">
+          <p:cNvPr id="35" name="Straight Connector 34">
             <a:extLst>
               <a:ext uri="{FF2B5EF4-FFF2-40B4-BE49-F238E27FC236}">
                 <a16:creationId xmlns:a16="http://schemas.microsoft.com/office/drawing/2014/main" id="{7E7C77BC-7138-40B1-A15B-20F57A494629}"/>
@@ -3994,8 +3997,8 @@
         </p:blipFill>
         <p:spPr>
           <a:xfrm>
-            <a:off x="618823" y="2277801"/>
-            <a:ext cx="5089511" cy="4338808"/>
+            <a:off x="546351" y="2277801"/>
+            <a:ext cx="5252813" cy="4478022"/>
           </a:xfrm>
           <a:prstGeom prst="rect">
             <a:avLst/>
@@ -4004,7 +4007,7 @@
       </p:pic>
       <p:cxnSp>
         <p:nvCxnSpPr>
-          <p:cNvPr id="14" name="Straight Connector 13">
+          <p:cNvPr id="37" name="Straight Connector 36">
             <a:extLst>
               <a:ext uri="{FF2B5EF4-FFF2-40B4-BE49-F238E27FC236}">
                 <a16:creationId xmlns:a16="http://schemas.microsoft.com/office/drawing/2014/main" id="{DB146403-F3D6-484B-B2ED-97F9565D0370}"/>
@@ -4056,10 +4059,10 @@
       </p:cxnSp>
       <p:pic>
         <p:nvPicPr>
-          <p:cNvPr id="4" name="Picture 3" descr="A screenshot of a cell phone&#10;&#10;Description automatically generated">
-            <a:extLst>
-              <a:ext uri="{FF2B5EF4-FFF2-40B4-BE49-F238E27FC236}">
-                <a16:creationId xmlns:a16="http://schemas.microsoft.com/office/drawing/2014/main" id="{F6DB4D98-1C46-4A86-BAB4-289D6CE4E2F7}"/>
+          <p:cNvPr id="3" name="Picture 2">
+            <a:extLst>
+              <a:ext uri="{FF2B5EF4-FFF2-40B4-BE49-F238E27FC236}">
+                <a16:creationId xmlns:a16="http://schemas.microsoft.com/office/drawing/2014/main" id="{EFFA9619-CA52-4F01-A8F1-6071A4172339}"/>
               </a:ext>
             </a:extLst>
           </p:cNvPr>
@@ -4076,8 +4079,8 @@
         </p:blipFill>
         <p:spPr>
           <a:xfrm>
-            <a:off x="6316917" y="4016378"/>
-            <a:ext cx="5743968" cy="818515"/>
+            <a:off x="6286499" y="4179650"/>
+            <a:ext cx="5709740" cy="813638"/>
           </a:xfrm>
           <a:prstGeom prst="rect">
             <a:avLst/>
@@ -4124,6 +4127,166 @@
       </p:grpSpPr>
       <p:sp useBgFill="1">
         <p:nvSpPr>
+          <p:cNvPr id="42" name="Rectangle 41">
+            <a:extLst>
+              <a:ext uri="{FF2B5EF4-FFF2-40B4-BE49-F238E27FC236}">
+                <a16:creationId xmlns:a16="http://schemas.microsoft.com/office/drawing/2014/main" id="{53F29798-D584-4792-9B62-3F5F5C36D619}"/>
+              </a:ext>
+              <a:ext uri="{C183D7F6-B498-43B3-948B-1728B52AA6E4}">
+                <adec:decorative xmlns:adec="http://schemas.microsoft.com/office/drawing/2017/decorative" val="1"/>
+              </a:ext>
+            </a:extLst>
+          </p:cNvPr>
+          <p:cNvSpPr>
+            <a:spLocks noGrp="1" noRot="1" noChangeAspect="1" noMove="1" noResize="1" noEditPoints="1" noAdjustHandles="1" noChangeArrowheads="1" noChangeShapeType="1" noTextEdit="1"/>
+          </p:cNvSpPr>
+          <p:nvPr>
+            <p:extLst>
+              <p:ext uri="{386F3935-93C4-4BCD-93E2-E3B085C9AB24}">
+                <p16:designElem xmlns:p16="http://schemas.microsoft.com/office/powerpoint/2015/main" val="1"/>
+              </p:ext>
+            </p:extLst>
+          </p:nvPr>
+        </p:nvSpPr>
+        <p:spPr>
+          <a:xfrm>
+            <a:off x="0" y="0"/>
+            <a:ext cx="12188952" cy="6858000"/>
+          </a:xfrm>
+          <a:prstGeom prst="rect">
+            <a:avLst/>
+          </a:prstGeom>
+          <a:ln>
+            <a:noFill/>
+          </a:ln>
+        </p:spPr>
+        <p:style>
+          <a:lnRef idx="2">
+            <a:schemeClr val="accent1">
+              <a:shade val="50000"/>
+            </a:schemeClr>
+          </a:lnRef>
+          <a:fillRef idx="1">
+            <a:schemeClr val="accent1"/>
+          </a:fillRef>
+          <a:effectRef idx="0">
+            <a:schemeClr val="accent1"/>
+          </a:effectRef>
+          <a:fontRef idx="minor">
+            <a:schemeClr val="lt1"/>
+          </a:fontRef>
+        </p:style>
+        <p:txBody>
+          <a:bodyPr rtlCol="0" anchor="ctr"/>
+          <a:lstStyle/>
+          <a:p>
+            <a:pPr algn="ctr"/>
+            <a:endParaRPr lang="en-US"/>
+          </a:p>
+        </p:txBody>
+      </p:sp>
+      <p:sp>
+        <p:nvSpPr>
+          <p:cNvPr id="2" name="Title 1">
+            <a:extLst>
+              <a:ext uri="{FF2B5EF4-FFF2-40B4-BE49-F238E27FC236}">
+                <a16:creationId xmlns:a16="http://schemas.microsoft.com/office/drawing/2014/main" id="{887B934B-8770-4DA9-815C-A24D63B63231}"/>
+              </a:ext>
+            </a:extLst>
+          </p:cNvPr>
+          <p:cNvSpPr>
+            <a:spLocks noGrp="1"/>
+          </p:cNvSpPr>
+          <p:nvPr>
+            <p:ph type="title"/>
+          </p:nvPr>
+        </p:nvSpPr>
+        <p:spPr>
+          <a:xfrm>
+            <a:off x="838200" y="562271"/>
+            <a:ext cx="10515600" cy="1128417"/>
+          </a:xfrm>
+        </p:spPr>
+        <p:txBody>
+          <a:bodyPr vert="horz" lIns="91440" tIns="45720" rIns="91440" bIns="45720" rtlCol="0" anchor="ctr">
+            <a:normAutofit/>
+          </a:bodyPr>
+          <a:lstStyle/>
+          <a:p>
+            <a:r>
+              <a:rPr lang="en-US" sz="5200" dirty="0"/>
+              <a:t>Approach</a:t>
+            </a:r>
+          </a:p>
+        </p:txBody>
+      </p:sp>
+      <p:pic>
+        <p:nvPicPr>
+          <p:cNvPr id="8" name="Picture 7">
+            <a:extLst>
+              <a:ext uri="{FF2B5EF4-FFF2-40B4-BE49-F238E27FC236}">
+                <a16:creationId xmlns:a16="http://schemas.microsoft.com/office/drawing/2014/main" id="{A5202513-A34C-4E73-B066-544273A0615F}"/>
+              </a:ext>
+            </a:extLst>
+          </p:cNvPr>
+          <p:cNvPicPr/>
+          <p:nvPr/>
+        </p:nvPicPr>
+        <p:blipFill rotWithShape="1">
+          <a:blip r:embed="rId2"/>
+          <a:srcRect t="14028" r="-1" b="5336"/>
+          <a:stretch/>
+        </p:blipFill>
+        <p:spPr>
+          <a:xfrm>
+            <a:off x="838200" y="1845426"/>
+            <a:ext cx="10512547" cy="4450303"/>
+          </a:xfrm>
+          <a:prstGeom prst="rect">
+            <a:avLst/>
+          </a:prstGeom>
+        </p:spPr>
+      </p:pic>
+    </p:spTree>
+    <p:extLst>
+      <p:ext uri="{BB962C8B-B14F-4D97-AF65-F5344CB8AC3E}">
+        <p14:creationId xmlns:p14="http://schemas.microsoft.com/office/powerpoint/2010/main" val="3895508382"/>
+      </p:ext>
+    </p:extLst>
+  </p:cSld>
+  <p:clrMapOvr>
+    <a:masterClrMapping/>
+  </p:clrMapOvr>
+</p:sld>
+</file>
+
+<file path=ppt/slides/slide4.xml><?xml version="1.0" encoding="utf-8"?>
+<p:sld xmlns:a="http://schemas.openxmlformats.org/drawingml/2006/main" xmlns:r="http://schemas.openxmlformats.org/officeDocument/2006/relationships" xmlns:p="http://schemas.openxmlformats.org/presentationml/2006/main">
+  <p:cSld>
+    <p:bg>
+      <p:bgPr>
+        <a:solidFill>
+          <a:schemeClr val="bg1"/>
+        </a:solidFill>
+        <a:effectLst/>
+      </p:bgPr>
+    </p:bg>
+    <p:spTree>
+      <p:nvGrpSpPr>
+        <p:cNvPr id="1" name=""/>
+        <p:cNvGrpSpPr/>
+        <p:nvPr/>
+      </p:nvGrpSpPr>
+      <p:grpSpPr>
+        <a:xfrm>
+          <a:off x="0" y="0"/>
+          <a:ext cx="0" cy="0"/>
+          <a:chOff x="0" y="0"/>
+          <a:chExt cx="0" cy="0"/>
+        </a:xfrm>
+      </p:grpSpPr>
+      <p:sp useBgFill="1">
+        <p:nvSpPr>
           <p:cNvPr id="8" name="Rectangle 7">
             <a:extLst>
               <a:ext uri="{FF2B5EF4-FFF2-40B4-BE49-F238E27FC236}">
@@ -4518,7 +4681,415 @@
 </p:sld>
 </file>
 
-<file path=ppt/slides/slide4.xml><?xml version="1.0" encoding="utf-8"?>
+<file path=ppt/slides/slide5.xml><?xml version="1.0" encoding="utf-8"?>
+<p:sld xmlns:a="http://schemas.openxmlformats.org/drawingml/2006/main" xmlns:r="http://schemas.openxmlformats.org/officeDocument/2006/relationships" xmlns:p="http://schemas.openxmlformats.org/presentationml/2006/main">
+  <p:cSld>
+    <p:bg>
+      <p:bgPr>
+        <a:solidFill>
+          <a:schemeClr val="bg1"/>
+        </a:solidFill>
+        <a:effectLst/>
+      </p:bgPr>
+    </p:bg>
+    <p:spTree>
+      <p:nvGrpSpPr>
+        <p:cNvPr id="1" name=""/>
+        <p:cNvGrpSpPr/>
+        <p:nvPr/>
+      </p:nvGrpSpPr>
+      <p:grpSpPr>
+        <a:xfrm>
+          <a:off x="0" y="0"/>
+          <a:ext cx="0" cy="0"/>
+          <a:chOff x="0" y="0"/>
+          <a:chExt cx="0" cy="0"/>
+        </a:xfrm>
+      </p:grpSpPr>
+      <p:sp useBgFill="1">
+        <p:nvSpPr>
+          <p:cNvPr id="33" name="Rectangle 32">
+            <a:extLst>
+              <a:ext uri="{FF2B5EF4-FFF2-40B4-BE49-F238E27FC236}">
+                <a16:creationId xmlns:a16="http://schemas.microsoft.com/office/drawing/2014/main" id="{D55CA618-78A6-47F6-B865-E9315164FB49}"/>
+              </a:ext>
+              <a:ext uri="{C183D7F6-B498-43B3-948B-1728B52AA6E4}">
+                <adec:decorative xmlns:adec="http://schemas.microsoft.com/office/drawing/2017/decorative" val="1"/>
+              </a:ext>
+            </a:extLst>
+          </p:cNvPr>
+          <p:cNvSpPr>
+            <a:spLocks noGrp="1" noRot="1" noChangeAspect="1" noMove="1" noResize="1" noEditPoints="1" noAdjustHandles="1" noChangeArrowheads="1" noChangeShapeType="1" noTextEdit="1"/>
+          </p:cNvSpPr>
+          <p:nvPr>
+            <p:extLst>
+              <p:ext uri="{386F3935-93C4-4BCD-93E2-E3B085C9AB24}">
+                <p16:designElem xmlns:p16="http://schemas.microsoft.com/office/powerpoint/2015/main" val="1"/>
+              </p:ext>
+            </p:extLst>
+          </p:nvPr>
+        </p:nvSpPr>
+        <p:spPr>
+          <a:xfrm>
+            <a:off x="0" y="0"/>
+            <a:ext cx="12191999" cy="6857365"/>
+          </a:xfrm>
+          <a:prstGeom prst="rect">
+            <a:avLst/>
+          </a:prstGeom>
+          <a:ln>
+            <a:noFill/>
+          </a:ln>
+        </p:spPr>
+        <p:style>
+          <a:lnRef idx="2">
+            <a:schemeClr val="accent1">
+              <a:shade val="50000"/>
+            </a:schemeClr>
+          </a:lnRef>
+          <a:fillRef idx="1">
+            <a:schemeClr val="accent1"/>
+          </a:fillRef>
+          <a:effectRef idx="0">
+            <a:schemeClr val="accent1"/>
+          </a:effectRef>
+          <a:fontRef idx="minor">
+            <a:schemeClr val="lt1"/>
+          </a:fontRef>
+        </p:style>
+        <p:txBody>
+          <a:bodyPr rtlCol="0" anchor="ctr"/>
+          <a:lstStyle/>
+          <a:p>
+            <a:pPr algn="ctr"/>
+            <a:endParaRPr lang="en-US"/>
+          </a:p>
+        </p:txBody>
+      </p:sp>
+      <p:grpSp>
+        <p:nvGrpSpPr>
+          <p:cNvPr id="35" name="Group 34">
+            <a:extLst>
+              <a:ext uri="{FF2B5EF4-FFF2-40B4-BE49-F238E27FC236}">
+                <a16:creationId xmlns:a16="http://schemas.microsoft.com/office/drawing/2014/main" id="{B83D307E-DF68-43F8-97CE-0AAE950A7129}"/>
+              </a:ext>
+              <a:ext uri="{C183D7F6-B498-43B3-948B-1728B52AA6E4}">
+                <adec:decorative xmlns:adec="http://schemas.microsoft.com/office/drawing/2017/decorative" val="1"/>
+              </a:ext>
+            </a:extLst>
+          </p:cNvPr>
+          <p:cNvGrpSpPr>
+            <a:grpSpLocks noGrp="1" noUngrp="1" noRot="1" noChangeAspect="1" noMove="1" noResize="1"/>
+          </p:cNvGrpSpPr>
+          <p:nvPr>
+            <p:extLst>
+              <p:ext uri="{386F3935-93C4-4BCD-93E2-E3B085C9AB24}">
+                <p16:designElem xmlns:p16="http://schemas.microsoft.com/office/powerpoint/2015/main" val="1"/>
+              </p:ext>
+            </p:extLst>
+          </p:nvPr>
+        </p:nvGrpSpPr>
+        <p:grpSpPr>
+          <a:xfrm>
+            <a:off x="2271255" y="-1"/>
+            <a:ext cx="7649490" cy="5728133"/>
+            <a:chOff x="329184" y="1"/>
+            <a:chExt cx="524256" cy="5728133"/>
+          </a:xfrm>
+        </p:grpSpPr>
+        <p:cxnSp>
+          <p:nvCxnSpPr>
+            <p:cNvPr id="36" name="Straight Connector 35">
+              <a:extLst>
+                <a:ext uri="{FF2B5EF4-FFF2-40B4-BE49-F238E27FC236}">
+                  <a16:creationId xmlns:a16="http://schemas.microsoft.com/office/drawing/2014/main" id="{5546E3D2-37BF-4528-9851-2B2F628234A2}"/>
+                </a:ext>
+                <a:ext uri="{C183D7F6-B498-43B3-948B-1728B52AA6E4}">
+                  <adec:decorative xmlns:adec="http://schemas.microsoft.com/office/drawing/2017/decorative" val="1"/>
+                </a:ext>
+              </a:extLst>
+            </p:cNvPr>
+            <p:cNvCxnSpPr>
+              <a:cxnSpLocks/>
+            </p:cNvCxnSpPr>
+            <p:nvPr>
+              <p:extLst>
+                <p:ext uri="{386F3935-93C4-4BCD-93E2-E3B085C9AB24}">
+                  <p16:designElem xmlns:p16="http://schemas.microsoft.com/office/powerpoint/2015/main" val="1"/>
+                </p:ext>
+              </p:extLst>
+            </p:nvPr>
+          </p:nvCxnSpPr>
+          <p:spPr>
+            <a:xfrm flipH="1">
+              <a:off x="329184" y="5728134"/>
+              <a:ext cx="523824" cy="0"/>
+            </a:xfrm>
+            <a:prstGeom prst="line">
+              <a:avLst/>
+            </a:prstGeom>
+            <a:ln w="152400">
+              <a:solidFill>
+                <a:schemeClr val="accent4"/>
+              </a:solidFill>
+            </a:ln>
+          </p:spPr>
+          <p:style>
+            <a:lnRef idx="1">
+              <a:schemeClr val="accent1"/>
+            </a:lnRef>
+            <a:fillRef idx="0">
+              <a:schemeClr val="accent1"/>
+            </a:fillRef>
+            <a:effectRef idx="0">
+              <a:schemeClr val="accent1"/>
+            </a:effectRef>
+            <a:fontRef idx="minor">
+              <a:schemeClr val="tx1"/>
+            </a:fontRef>
+          </p:style>
+        </p:cxnSp>
+        <p:sp>
+          <p:nvSpPr>
+            <p:cNvPr id="37" name="Rectangle 36">
+              <a:extLst>
+                <a:ext uri="{FF2B5EF4-FFF2-40B4-BE49-F238E27FC236}">
+                  <a16:creationId xmlns:a16="http://schemas.microsoft.com/office/drawing/2014/main" id="{752A0C69-DC4E-4FC0-843C-BAA27B3A5621}"/>
+                </a:ext>
+                <a:ext uri="{C183D7F6-B498-43B3-948B-1728B52AA6E4}">
+                  <adec:decorative xmlns:adec="http://schemas.microsoft.com/office/drawing/2017/decorative" val="1"/>
+                </a:ext>
+              </a:extLst>
+            </p:cNvPr>
+            <p:cNvSpPr/>
+            <p:nvPr>
+              <p:extLst>
+                <p:ext uri="{386F3935-93C4-4BCD-93E2-E3B085C9AB24}">
+                  <p16:designElem xmlns:p16="http://schemas.microsoft.com/office/powerpoint/2015/main" val="1"/>
+                </p:ext>
+              </p:extLst>
+            </p:nvPr>
+          </p:nvSpPr>
+          <p:spPr>
+            <a:xfrm>
+              <a:off x="329184" y="1"/>
+              <a:ext cx="524256" cy="5532119"/>
+            </a:xfrm>
+            <a:prstGeom prst="rect">
+              <a:avLst/>
+            </a:prstGeom>
+            <a:solidFill>
+              <a:schemeClr val="accent4"/>
+            </a:solidFill>
+            <a:ln>
+              <a:noFill/>
+            </a:ln>
+          </p:spPr>
+          <p:style>
+            <a:lnRef idx="2">
+              <a:schemeClr val="accent1">
+                <a:shade val="50000"/>
+              </a:schemeClr>
+            </a:lnRef>
+            <a:fillRef idx="1">
+              <a:schemeClr val="accent1"/>
+            </a:fillRef>
+            <a:effectRef idx="0">
+              <a:schemeClr val="accent1"/>
+            </a:effectRef>
+            <a:fontRef idx="minor">
+              <a:schemeClr val="lt1"/>
+            </a:fontRef>
+          </p:style>
+          <p:txBody>
+            <a:bodyPr rtlCol="0" anchor="ctr"/>
+            <a:lstStyle/>
+            <a:p>
+              <a:pPr algn="ctr"/>
+              <a:endParaRPr lang="en-US" dirty="0"/>
+            </a:p>
+          </p:txBody>
+        </p:sp>
+      </p:grpSp>
+      <p:sp>
+        <p:nvSpPr>
+          <p:cNvPr id="39" name="Rectangle 38">
+            <a:extLst>
+              <a:ext uri="{FF2B5EF4-FFF2-40B4-BE49-F238E27FC236}">
+                <a16:creationId xmlns:a16="http://schemas.microsoft.com/office/drawing/2014/main" id="{8ED94938-268E-4C0A-A08A-B3980C78BAEB}"/>
+              </a:ext>
+              <a:ext uri="{C183D7F6-B498-43B3-948B-1728B52AA6E4}">
+                <adec:decorative xmlns:adec="http://schemas.microsoft.com/office/drawing/2017/decorative" val="1"/>
+              </a:ext>
+            </a:extLst>
+          </p:cNvPr>
+          <p:cNvSpPr>
+            <a:spLocks noGrp="1" noRot="1" noChangeAspect="1" noMove="1" noResize="1" noEditPoints="1" noAdjustHandles="1" noChangeArrowheads="1" noChangeShapeType="1" noTextEdit="1"/>
+          </p:cNvSpPr>
+          <p:nvPr>
+            <p:extLst>
+              <p:ext uri="{386F3935-93C4-4BCD-93E2-E3B085C9AB24}">
+                <p16:designElem xmlns:p16="http://schemas.microsoft.com/office/powerpoint/2015/main" val="1"/>
+              </p:ext>
+            </p:extLst>
+          </p:nvPr>
+        </p:nvSpPr>
+        <p:spPr>
+          <a:xfrm>
+            <a:off x="596464" y="318045"/>
+            <a:ext cx="10999072" cy="5325139"/>
+          </a:xfrm>
+          <a:prstGeom prst="rect">
+            <a:avLst/>
+          </a:prstGeom>
+          <a:solidFill>
+            <a:schemeClr val="bg1"/>
+          </a:solidFill>
+          <a:ln>
+            <a:noFill/>
+          </a:ln>
+          <a:effectLst>
+            <a:outerShdw blurRad="139700" dist="127000" dir="5400000" algn="t" rotWithShape="0">
+              <a:prstClr val="black">
+                <a:alpha val="15000"/>
+              </a:prstClr>
+            </a:outerShdw>
+          </a:effectLst>
+        </p:spPr>
+        <p:style>
+          <a:lnRef idx="2">
+            <a:schemeClr val="accent1">
+              <a:shade val="50000"/>
+            </a:schemeClr>
+          </a:lnRef>
+          <a:fillRef idx="1">
+            <a:schemeClr val="accent1"/>
+          </a:fillRef>
+          <a:effectRef idx="0">
+            <a:schemeClr val="accent1"/>
+          </a:effectRef>
+          <a:fontRef idx="minor">
+            <a:schemeClr val="lt1"/>
+          </a:fontRef>
+        </p:style>
+        <p:txBody>
+          <a:bodyPr rtlCol="0" anchor="ctr"/>
+          <a:lstStyle/>
+          <a:p>
+            <a:pPr algn="ctr"/>
+            <a:endParaRPr lang="en-US"/>
+          </a:p>
+        </p:txBody>
+      </p:sp>
+      <p:pic>
+        <p:nvPicPr>
+          <p:cNvPr id="6" name="Picture 5">
+            <a:extLst>
+              <a:ext uri="{FF2B5EF4-FFF2-40B4-BE49-F238E27FC236}">
+                <a16:creationId xmlns:a16="http://schemas.microsoft.com/office/drawing/2014/main" id="{D3D5D7B1-5504-41F7-B93F-1C2E4754F070}"/>
+              </a:ext>
+            </a:extLst>
+          </p:cNvPr>
+          <p:cNvPicPr>
+            <a:picLocks noChangeAspect="1"/>
+          </p:cNvPicPr>
+          <p:nvPr/>
+        </p:nvPicPr>
+        <p:blipFill>
+          <a:blip r:embed="rId2"/>
+          <a:stretch>
+            <a:fillRect/>
+          </a:stretch>
+        </p:blipFill>
+        <p:spPr>
+          <a:xfrm>
+            <a:off x="2115215" y="538913"/>
+            <a:ext cx="7955266" cy="835303"/>
+          </a:xfrm>
+          <a:prstGeom prst="rect">
+            <a:avLst/>
+          </a:prstGeom>
+        </p:spPr>
+      </p:pic>
+      <p:pic>
+        <p:nvPicPr>
+          <p:cNvPr id="3" name="Picture 2">
+            <a:extLst>
+              <a:ext uri="{FF2B5EF4-FFF2-40B4-BE49-F238E27FC236}">
+                <a16:creationId xmlns:a16="http://schemas.microsoft.com/office/drawing/2014/main" id="{E24D8532-8E7B-4698-A753-C1F59F21C9F7}"/>
+              </a:ext>
+            </a:extLst>
+          </p:cNvPr>
+          <p:cNvPicPr>
+            <a:picLocks noChangeAspect="1"/>
+          </p:cNvPicPr>
+          <p:nvPr/>
+        </p:nvPicPr>
+        <p:blipFill>
+          <a:blip r:embed="rId3"/>
+          <a:stretch>
+            <a:fillRect/>
+          </a:stretch>
+        </p:blipFill>
+        <p:spPr>
+          <a:xfrm>
+            <a:off x="3661660" y="1462033"/>
+            <a:ext cx="4868679" cy="5235140"/>
+          </a:xfrm>
+          <a:prstGeom prst="rect">
+            <a:avLst/>
+          </a:prstGeom>
+        </p:spPr>
+      </p:pic>
+      <p:sp>
+        <p:nvSpPr>
+          <p:cNvPr id="9" name="TextBox 8">
+            <a:extLst>
+              <a:ext uri="{FF2B5EF4-FFF2-40B4-BE49-F238E27FC236}">
+                <a16:creationId xmlns:a16="http://schemas.microsoft.com/office/drawing/2014/main" id="{E4253FDD-FB0C-4F06-BEB1-673CB6D0BE38}"/>
+              </a:ext>
+            </a:extLst>
+          </p:cNvPr>
+          <p:cNvSpPr txBox="1"/>
+          <p:nvPr/>
+        </p:nvSpPr>
+        <p:spPr>
+          <a:xfrm>
+            <a:off x="284701" y="3316160"/>
+            <a:ext cx="2539563" cy="584775"/>
+          </a:xfrm>
+          <a:prstGeom prst="rect">
+            <a:avLst/>
+          </a:prstGeom>
+          <a:noFill/>
+        </p:spPr>
+        <p:txBody>
+          <a:bodyPr wrap="square" rtlCol="0">
+            <a:spAutoFit/>
+          </a:bodyPr>
+          <a:lstStyle/>
+          <a:p>
+            <a:r>
+              <a:rPr lang="en-GB" sz="3200" dirty="0"/>
+              <a:t>IMS Starter…</a:t>
+            </a:r>
+          </a:p>
+        </p:txBody>
+      </p:sp>
+    </p:spTree>
+    <p:extLst>
+      <p:ext uri="{BB962C8B-B14F-4D97-AF65-F5344CB8AC3E}">
+        <p14:creationId xmlns:p14="http://schemas.microsoft.com/office/powerpoint/2010/main" val="1248129071"/>
+      </p:ext>
+    </p:extLst>
+  </p:cSld>
+  <p:clrMapOvr>
+    <a:masterClrMapping/>
+  </p:clrMapOvr>
+</p:sld>
+</file>
+
+<file path=ppt/slides/slide6.xml><?xml version="1.0" encoding="utf-8"?>
 <p:sld xmlns:a="http://schemas.openxmlformats.org/drawingml/2006/main" xmlns:r="http://schemas.openxmlformats.org/officeDocument/2006/relationships" xmlns:p="http://schemas.openxmlformats.org/presentationml/2006/main">
   <p:cSld>
     <p:spTree>
@@ -5221,7 +5792,7 @@
         </p:nvCxnSpPr>
         <p:spPr>
           <a:xfrm flipV="1">
-            <a:off x="994508" y="2114494"/>
+            <a:off x="1130302" y="2139272"/>
             <a:ext cx="693615" cy="1015567"/>
           </a:xfrm>
           <a:prstGeom prst="straightConnector1">
@@ -5779,10 +6350,236 @@
           </a:p>
         </p:txBody>
       </p:sp>
+      <p:sp>
+        <p:nvSpPr>
+          <p:cNvPr id="2" name="TextBox 1">
+            <a:extLst>
+              <a:ext uri="{FF2B5EF4-FFF2-40B4-BE49-F238E27FC236}">
+                <a16:creationId xmlns:a16="http://schemas.microsoft.com/office/drawing/2014/main" id="{913393BD-1979-4017-853D-0FC397FB1E8B}"/>
+              </a:ext>
+            </a:extLst>
+          </p:cNvPr>
+          <p:cNvSpPr txBox="1"/>
+          <p:nvPr/>
+        </p:nvSpPr>
+        <p:spPr>
+          <a:xfrm>
+            <a:off x="5767752" y="4276209"/>
+            <a:ext cx="863600" cy="369332"/>
+          </a:xfrm>
+          <a:prstGeom prst="rect">
+            <a:avLst/>
+          </a:prstGeom>
+          <a:noFill/>
+        </p:spPr>
+        <p:txBody>
+          <a:bodyPr wrap="square" rtlCol="0">
+            <a:spAutoFit/>
+          </a:bodyPr>
+          <a:lstStyle/>
+          <a:p>
+            <a:r>
+              <a:rPr lang="en-GB" i="1" dirty="0"/>
+              <a:t>Jenkins</a:t>
+            </a:r>
+          </a:p>
+        </p:txBody>
+      </p:sp>
+      <p:cxnSp>
+        <p:nvCxnSpPr>
+          <p:cNvPr id="37" name="Straight Arrow Connector 36">
+            <a:extLst>
+              <a:ext uri="{FF2B5EF4-FFF2-40B4-BE49-F238E27FC236}">
+                <a16:creationId xmlns:a16="http://schemas.microsoft.com/office/drawing/2014/main" id="{F9245A47-ABE7-4DE6-AA44-AF5C58911DEF}"/>
+              </a:ext>
+            </a:extLst>
+          </p:cNvPr>
+          <p:cNvCxnSpPr>
+            <a:cxnSpLocks/>
+          </p:cNvCxnSpPr>
+          <p:nvPr/>
+        </p:nvCxnSpPr>
+        <p:spPr>
+          <a:xfrm rot="10800000" flipV="1">
+            <a:off x="783494" y="1928519"/>
+            <a:ext cx="693615" cy="1015567"/>
+          </a:xfrm>
+          <a:prstGeom prst="straightConnector1">
+            <a:avLst/>
+          </a:prstGeom>
+          <a:ln>
+            <a:tailEnd type="triangle"/>
+          </a:ln>
+        </p:spPr>
+        <p:style>
+          <a:lnRef idx="1">
+            <a:schemeClr val="accent1"/>
+          </a:lnRef>
+          <a:fillRef idx="0">
+            <a:schemeClr val="accent1"/>
+          </a:fillRef>
+          <a:effectRef idx="0">
+            <a:schemeClr val="accent1"/>
+          </a:effectRef>
+          <a:fontRef idx="minor">
+            <a:schemeClr val="tx1"/>
+          </a:fontRef>
+        </p:style>
+      </p:cxnSp>
+      <p:sp>
+        <p:nvSpPr>
+          <p:cNvPr id="5" name="TextBox 4">
+            <a:extLst>
+              <a:ext uri="{FF2B5EF4-FFF2-40B4-BE49-F238E27FC236}">
+                <a16:creationId xmlns:a16="http://schemas.microsoft.com/office/drawing/2014/main" id="{3F13ADEA-657B-4883-8C89-E9C37DF86403}"/>
+              </a:ext>
+            </a:extLst>
+          </p:cNvPr>
+          <p:cNvSpPr txBox="1"/>
+          <p:nvPr/>
+        </p:nvSpPr>
+        <p:spPr>
+          <a:xfrm>
+            <a:off x="75229" y="1831495"/>
+            <a:ext cx="1397972" cy="307777"/>
+          </a:xfrm>
+          <a:prstGeom prst="rect">
+            <a:avLst/>
+          </a:prstGeom>
+          <a:noFill/>
+        </p:spPr>
+        <p:txBody>
+          <a:bodyPr wrap="square" rtlCol="0">
+            <a:spAutoFit/>
+          </a:bodyPr>
+          <a:lstStyle/>
+          <a:p>
+            <a:r>
+              <a:rPr lang="en-GB" sz="1400" dirty="0"/>
+              <a:t>Access database</a:t>
+            </a:r>
+          </a:p>
+        </p:txBody>
+      </p:sp>
+      <p:sp>
+        <p:nvSpPr>
+          <p:cNvPr id="7" name="TextBox 6">
+            <a:extLst>
+              <a:ext uri="{FF2B5EF4-FFF2-40B4-BE49-F238E27FC236}">
+                <a16:creationId xmlns:a16="http://schemas.microsoft.com/office/drawing/2014/main" id="{5064E4DB-9DE5-4AF4-BB33-72594E0E46C8}"/>
+              </a:ext>
+            </a:extLst>
+          </p:cNvPr>
+          <p:cNvSpPr txBox="1"/>
+          <p:nvPr/>
+        </p:nvSpPr>
+        <p:spPr>
+          <a:xfrm>
+            <a:off x="1360243" y="2874812"/>
+            <a:ext cx="1828431" cy="307777"/>
+          </a:xfrm>
+          <a:prstGeom prst="rect">
+            <a:avLst/>
+          </a:prstGeom>
+          <a:noFill/>
+        </p:spPr>
+        <p:txBody>
+          <a:bodyPr wrap="square" rtlCol="0">
+            <a:spAutoFit/>
+          </a:bodyPr>
+          <a:lstStyle/>
+          <a:p>
+            <a:r>
+              <a:rPr lang="en-GB" sz="1400" dirty="0"/>
+              <a:t>Send schema and data</a:t>
+            </a:r>
+          </a:p>
+        </p:txBody>
+      </p:sp>
     </p:spTree>
     <p:extLst>
       <p:ext uri="{BB962C8B-B14F-4D97-AF65-F5344CB8AC3E}">
         <p14:creationId xmlns:p14="http://schemas.microsoft.com/office/powerpoint/2010/main" val="3449752075"/>
+      </p:ext>
+    </p:extLst>
+  </p:cSld>
+  <p:clrMapOvr>
+    <a:masterClrMapping/>
+  </p:clrMapOvr>
+</p:sld>
+</file>
+
+<file path=ppt/slides/slide7.xml><?xml version="1.0" encoding="utf-8"?>
+<p:sld xmlns:a="http://schemas.openxmlformats.org/drawingml/2006/main" xmlns:r="http://schemas.openxmlformats.org/officeDocument/2006/relationships" xmlns:p="http://schemas.openxmlformats.org/presentationml/2006/main">
+  <p:cSld>
+    <p:spTree>
+      <p:nvGrpSpPr>
+        <p:cNvPr id="1" name=""/>
+        <p:cNvGrpSpPr/>
+        <p:nvPr/>
+      </p:nvGrpSpPr>
+      <p:grpSpPr>
+        <a:xfrm>
+          <a:off x="0" y="0"/>
+          <a:ext cx="0" cy="0"/>
+          <a:chOff x="0" y="0"/>
+          <a:chExt cx="0" cy="0"/>
+        </a:xfrm>
+      </p:grpSpPr>
+      <p:sp>
+        <p:nvSpPr>
+          <p:cNvPr id="2" name="Title 1">
+            <a:extLst>
+              <a:ext uri="{FF2B5EF4-FFF2-40B4-BE49-F238E27FC236}">
+                <a16:creationId xmlns:a16="http://schemas.microsoft.com/office/drawing/2014/main" id="{F88A7C38-0C05-4C9B-831F-74FBAEAB431D}"/>
+              </a:ext>
+            </a:extLst>
+          </p:cNvPr>
+          <p:cNvSpPr>
+            <a:spLocks noGrp="1"/>
+          </p:cNvSpPr>
+          <p:nvPr>
+            <p:ph type="title"/>
+          </p:nvPr>
+        </p:nvSpPr>
+        <p:spPr/>
+        <p:txBody>
+          <a:bodyPr/>
+          <a:lstStyle/>
+          <a:p>
+            <a:endParaRPr lang="en-GB"/>
+          </a:p>
+        </p:txBody>
+      </p:sp>
+      <p:sp>
+        <p:nvSpPr>
+          <p:cNvPr id="3" name="Content Placeholder 2">
+            <a:extLst>
+              <a:ext uri="{FF2B5EF4-FFF2-40B4-BE49-F238E27FC236}">
+                <a16:creationId xmlns:a16="http://schemas.microsoft.com/office/drawing/2014/main" id="{BE115241-5A2C-4441-B635-68614E30CA51}"/>
+              </a:ext>
+            </a:extLst>
+          </p:cNvPr>
+          <p:cNvSpPr>
+            <a:spLocks noGrp="1"/>
+          </p:cNvSpPr>
+          <p:nvPr>
+            <p:ph idx="1"/>
+          </p:nvPr>
+        </p:nvSpPr>
+        <p:spPr/>
+        <p:txBody>
+          <a:bodyPr/>
+          <a:lstStyle/>
+          <a:p>
+            <a:endParaRPr lang="en-GB"/>
+          </a:p>
+        </p:txBody>
+      </p:sp>
+    </p:spTree>
+    <p:extLst>
+      <p:ext uri="{BB962C8B-B14F-4D97-AF65-F5344CB8AC3E}">
+        <p14:creationId xmlns:p14="http://schemas.microsoft.com/office/powerpoint/2010/main" val="1901161825"/>
       </p:ext>
     </p:extLst>
   </p:cSld>

</xml_diff>